<commit_message>
add rbac to kubernetes
</commit_message>
<xml_diff>
--- a/notes/day4/Day4Presentation.pptx
+++ b/notes/day4/Day4Presentation.pptx
@@ -5,7 +5,7 @@
     <p:sldMasterId id="2147483648" r:id="rId1"/>
   </p:sldMasterIdLst>
   <p:notesMasterIdLst>
-    <p:notesMasterId r:id="rId76"/>
+    <p:notesMasterId r:id="rId82"/>
   </p:notesMasterIdLst>
   <p:sldIdLst>
     <p:sldId id="256" r:id="rId2"/>
@@ -74,14 +74,20 @@
     <p:sldId id="403" r:id="rId65"/>
     <p:sldId id="402" r:id="rId66"/>
     <p:sldId id="399" r:id="rId67"/>
-    <p:sldId id="405" r:id="rId68"/>
-    <p:sldId id="406" r:id="rId69"/>
-    <p:sldId id="407" r:id="rId70"/>
-    <p:sldId id="408" r:id="rId71"/>
-    <p:sldId id="409" r:id="rId72"/>
-    <p:sldId id="410" r:id="rId73"/>
-    <p:sldId id="411" r:id="rId74"/>
-    <p:sldId id="404" r:id="rId75"/>
+    <p:sldId id="432" r:id="rId68"/>
+    <p:sldId id="433" r:id="rId69"/>
+    <p:sldId id="434" r:id="rId70"/>
+    <p:sldId id="435" r:id="rId71"/>
+    <p:sldId id="436" r:id="rId72"/>
+    <p:sldId id="437" r:id="rId73"/>
+    <p:sldId id="405" r:id="rId74"/>
+    <p:sldId id="406" r:id="rId75"/>
+    <p:sldId id="407" r:id="rId76"/>
+    <p:sldId id="408" r:id="rId77"/>
+    <p:sldId id="409" r:id="rId78"/>
+    <p:sldId id="410" r:id="rId79"/>
+    <p:sldId id="411" r:id="rId80"/>
+    <p:sldId id="404" r:id="rId81"/>
   </p:sldIdLst>
   <p:sldSz cx="12192000" cy="6858000"/>
   <p:notesSz cx="6858000" cy="9144000"/>
@@ -270,7 +276,7 @@
           <a:p>
             <a:fld id="{F15A6252-5F50-4106-9C23-9E03A675631E}" type="datetimeFigureOut">
               <a:rPr lang="en-IN" smtClean="0"/>
-              <a:t>26-02-2020</a:t>
+              <a:t>19-06-2020</a:t>
             </a:fld>
             <a:endParaRPr lang="en-IN"/>
           </a:p>
@@ -1030,7 +1036,7 @@
           <a:p>
             <a:fld id="{9B3CEC36-385F-48D4-8D43-C67229F8A2A2}" type="slidenum">
               <a:rPr lang="en-IN" smtClean="0"/>
-              <a:t>71</a:t>
+              <a:t>77</a:t>
             </a:fld>
             <a:endParaRPr lang="en-IN"/>
           </a:p>
@@ -1114,7 +1120,7 @@
           <a:p>
             <a:fld id="{9B3CEC36-385F-48D4-8D43-C67229F8A2A2}" type="slidenum">
               <a:rPr lang="en-IN" smtClean="0"/>
-              <a:t>72</a:t>
+              <a:t>78</a:t>
             </a:fld>
             <a:endParaRPr lang="en-IN"/>
           </a:p>
@@ -1198,7 +1204,7 @@
           <a:p>
             <a:fld id="{9B3CEC36-385F-48D4-8D43-C67229F8A2A2}" type="slidenum">
               <a:rPr lang="en-IN" smtClean="0"/>
-              <a:t>73</a:t>
+              <a:t>79</a:t>
             </a:fld>
             <a:endParaRPr lang="en-IN"/>
           </a:p>
@@ -1366,7 +1372,7 @@
           <a:p>
             <a:fld id="{4086692B-153F-4DFE-BFBD-A2AE2C7443B6}" type="datetimeFigureOut">
               <a:rPr lang="en-IN" smtClean="0"/>
-              <a:t>26-02-2020</a:t>
+              <a:t>19-06-2020</a:t>
             </a:fld>
             <a:endParaRPr lang="en-IN"/>
           </a:p>
@@ -1566,7 +1572,7 @@
           <a:p>
             <a:fld id="{4086692B-153F-4DFE-BFBD-A2AE2C7443B6}" type="datetimeFigureOut">
               <a:rPr lang="en-IN" smtClean="0"/>
-              <a:t>26-02-2020</a:t>
+              <a:t>19-06-2020</a:t>
             </a:fld>
             <a:endParaRPr lang="en-IN"/>
           </a:p>
@@ -1776,7 +1782,7 @@
           <a:p>
             <a:fld id="{4086692B-153F-4DFE-BFBD-A2AE2C7443B6}" type="datetimeFigureOut">
               <a:rPr lang="en-IN" smtClean="0"/>
-              <a:t>26-02-2020</a:t>
+              <a:t>19-06-2020</a:t>
             </a:fld>
             <a:endParaRPr lang="en-IN"/>
           </a:p>
@@ -1976,7 +1982,7 @@
           <a:p>
             <a:fld id="{4086692B-153F-4DFE-BFBD-A2AE2C7443B6}" type="datetimeFigureOut">
               <a:rPr lang="en-IN" smtClean="0"/>
-              <a:t>26-02-2020</a:t>
+              <a:t>19-06-2020</a:t>
             </a:fld>
             <a:endParaRPr lang="en-IN"/>
           </a:p>
@@ -2252,7 +2258,7 @@
           <a:p>
             <a:fld id="{4086692B-153F-4DFE-BFBD-A2AE2C7443B6}" type="datetimeFigureOut">
               <a:rPr lang="en-IN" smtClean="0"/>
-              <a:t>26-02-2020</a:t>
+              <a:t>19-06-2020</a:t>
             </a:fld>
             <a:endParaRPr lang="en-IN"/>
           </a:p>
@@ -2520,7 +2526,7 @@
           <a:p>
             <a:fld id="{4086692B-153F-4DFE-BFBD-A2AE2C7443B6}" type="datetimeFigureOut">
               <a:rPr lang="en-IN" smtClean="0"/>
-              <a:t>26-02-2020</a:t>
+              <a:t>19-06-2020</a:t>
             </a:fld>
             <a:endParaRPr lang="en-IN"/>
           </a:p>
@@ -2935,7 +2941,7 @@
           <a:p>
             <a:fld id="{4086692B-153F-4DFE-BFBD-A2AE2C7443B6}" type="datetimeFigureOut">
               <a:rPr lang="en-IN" smtClean="0"/>
-              <a:t>26-02-2020</a:t>
+              <a:t>19-06-2020</a:t>
             </a:fld>
             <a:endParaRPr lang="en-IN"/>
           </a:p>
@@ -3077,7 +3083,7 @@
           <a:p>
             <a:fld id="{4086692B-153F-4DFE-BFBD-A2AE2C7443B6}" type="datetimeFigureOut">
               <a:rPr lang="en-IN" smtClean="0"/>
-              <a:t>26-02-2020</a:t>
+              <a:t>19-06-2020</a:t>
             </a:fld>
             <a:endParaRPr lang="en-IN"/>
           </a:p>
@@ -3190,7 +3196,7 @@
           <a:p>
             <a:fld id="{4086692B-153F-4DFE-BFBD-A2AE2C7443B6}" type="datetimeFigureOut">
               <a:rPr lang="en-IN" smtClean="0"/>
-              <a:t>26-02-2020</a:t>
+              <a:t>19-06-2020</a:t>
             </a:fld>
             <a:endParaRPr lang="en-IN"/>
           </a:p>
@@ -3503,7 +3509,7 @@
           <a:p>
             <a:fld id="{4086692B-153F-4DFE-BFBD-A2AE2C7443B6}" type="datetimeFigureOut">
               <a:rPr lang="en-IN" smtClean="0"/>
-              <a:t>26-02-2020</a:t>
+              <a:t>19-06-2020</a:t>
             </a:fld>
             <a:endParaRPr lang="en-IN"/>
           </a:p>
@@ -3792,7 +3798,7 @@
           <a:p>
             <a:fld id="{4086692B-153F-4DFE-BFBD-A2AE2C7443B6}" type="datetimeFigureOut">
               <a:rPr lang="en-IN" smtClean="0"/>
-              <a:t>26-02-2020</a:t>
+              <a:t>19-06-2020</a:t>
             </a:fld>
             <a:endParaRPr lang="en-IN"/>
           </a:p>
@@ -4035,7 +4041,7 @@
           <a:p>
             <a:fld id="{4086692B-153F-4DFE-BFBD-A2AE2C7443B6}" type="datetimeFigureOut">
               <a:rPr lang="en-IN" smtClean="0"/>
-              <a:t>26-02-2020</a:t>
+              <a:t>19-06-2020</a:t>
             </a:fld>
             <a:endParaRPr lang="en-IN"/>
           </a:p>
@@ -7430,55 +7436,17 @@
             </a:endParaRPr>
           </a:p>
           <a:p>
-            <a:endParaRPr lang="en-IN" sz="2400" b="1" dirty="0">
-              <a:solidFill>
-                <a:schemeClr val="bg1"/>
-              </a:solidFill>
-            </a:endParaRPr>
-          </a:p>
-        </p:txBody>
-      </p:sp>
-      <p:pic>
-        <p:nvPicPr>
-          <p:cNvPr id="4" name="Picture 2" descr="https://www.orsymphony.org/globalassets/hero-images/instruments-of-the-orchestra/orchestra-4_pc-leah-nash_1900x600.jpg"/>
-          <p:cNvPicPr>
-            <a:picLocks noChangeAspect="1" noChangeArrowheads="1"/>
-          </p:cNvPicPr>
-          <p:nvPr/>
-        </p:nvPicPr>
-        <p:blipFill>
-          <a:blip r:embed="rId2">
-            <a:extLst>
-              <a:ext uri="{28A0092B-C50C-407E-A947-70E740481C1C}">
-                <a14:useLocalDpi xmlns:a14="http://schemas.microsoft.com/office/drawing/2010/main" val="0"/>
-              </a:ext>
-            </a:extLst>
-          </a:blip>
-          <a:srcRect/>
-          <a:stretch>
-            <a:fillRect/>
-          </a:stretch>
-        </p:blipFill>
-        <p:spPr bwMode="auto">
-          <a:xfrm>
-            <a:off x="838200" y="1395663"/>
-            <a:ext cx="10775247" cy="5243362"/>
-          </a:xfrm>
-          <a:prstGeom prst="rect">
-            <a:avLst/>
-          </a:prstGeom>
-          <a:noFill/>
-          <a:extLst>
-            <a:ext uri="{909E8E84-426E-40DD-AFC4-6F175D3DCCD1}">
-              <a14:hiddenFill xmlns:a14="http://schemas.microsoft.com/office/drawing/2010/main">
-                <a:solidFill>
-                  <a:srgbClr val="FFFFFF"/>
-                </a:solidFill>
-              </a14:hiddenFill>
-            </a:ext>
-          </a:extLst>
-        </p:spPr>
-      </p:pic>
+            <a:r>
+              <a:rPr lang="en-IN" sz="2400" b="1" dirty="0">
+                <a:solidFill>
+                  <a:schemeClr val="bg1"/>
+                </a:solidFill>
+              </a:rPr>
+              <a:t>Orchestration image</a:t>
+            </a:r>
+          </a:p>
+        </p:txBody>
+      </p:sp>
     </p:spTree>
     <p:extLst>
       <p:ext uri="{BB962C8B-B14F-4D97-AF65-F5344CB8AC3E}">
@@ -20556,7 +20524,7 @@
                   <a:schemeClr val="bg1"/>
                 </a:solidFill>
               </a:rPr>
-              <a:t>Kubernetes Networking</a:t>
+              <a:t>Secrets</a:t>
             </a:r>
             <a:endParaRPr lang="en-IN" b="1" dirty="0">
               <a:solidFill>
@@ -20639,16 +20607,11 @@
         <p:spPr>
           <a:xfrm>
             <a:off x="965203" y="2065867"/>
-            <a:ext cx="10058399" cy="2846933"/>
+            <a:ext cx="10058399" cy="3785652"/>
           </a:xfrm>
           <a:prstGeom prst="rect">
             <a:avLst/>
           </a:prstGeom>
-          <a:solidFill>
-            <a:schemeClr val="accent3">
-              <a:lumMod val="75000"/>
-            </a:schemeClr>
-          </a:solidFill>
         </p:spPr>
         <p:txBody>
           <a:bodyPr wrap="square">
@@ -20657,91 +20620,125 @@
           <a:lstStyle/>
           <a:p>
             <a:r>
-              <a:rPr lang="en-US" sz="2500" b="1" dirty="0">
-                <a:solidFill>
-                  <a:schemeClr val="bg1"/>
-                </a:solidFill>
-              </a:rPr>
-              <a:t>Container to Container</a:t>
-            </a:r>
-          </a:p>
-          <a:p>
-            <a:r>
-              <a:rPr lang="en-US" b="1" dirty="0">
-                <a:solidFill>
-                  <a:schemeClr val="bg1"/>
-                </a:solidFill>
-              </a:rPr>
-              <a:t>				</a:t>
-            </a:r>
-          </a:p>
-          <a:p>
-            <a:r>
-              <a:rPr lang="en-US" b="1" dirty="0">
-                <a:solidFill>
-                  <a:schemeClr val="bg1"/>
-                </a:solidFill>
-              </a:rPr>
-              <a:t>						</a:t>
-            </a:r>
-            <a:r>
-              <a:rPr lang="en-US" sz="2500" b="1" dirty="0">
-                <a:solidFill>
-                  <a:schemeClr val="bg1"/>
-                </a:solidFill>
-              </a:rPr>
-              <a:t>Pod to Pod</a:t>
-            </a:r>
-          </a:p>
-          <a:p>
-            <a:endParaRPr lang="en-US" b="1" dirty="0">
-              <a:solidFill>
-                <a:schemeClr val="bg1"/>
-              </a:solidFill>
-            </a:endParaRPr>
-          </a:p>
-          <a:p>
-            <a:endParaRPr lang="en-US" b="1" dirty="0">
-              <a:solidFill>
-                <a:schemeClr val="bg1"/>
-              </a:solidFill>
-            </a:endParaRPr>
-          </a:p>
-          <a:p>
-            <a:endParaRPr lang="en-US" sz="2500" b="1" dirty="0">
-              <a:solidFill>
-                <a:schemeClr val="bg1"/>
-              </a:solidFill>
-            </a:endParaRPr>
-          </a:p>
-          <a:p>
-            <a:r>
-              <a:rPr lang="en-US" sz="2500" b="1" dirty="0">
-                <a:solidFill>
-                  <a:schemeClr val="bg1"/>
-                </a:solidFill>
-              </a:rPr>
-              <a:t>Pod to Service</a:t>
-            </a:r>
-          </a:p>
-          <a:p>
-            <a:r>
-              <a:rPr lang="en-US" b="1" dirty="0">
-                <a:solidFill>
-                  <a:schemeClr val="bg1"/>
-                </a:solidFill>
-              </a:rPr>
-              <a:t>						</a:t>
-            </a:r>
-            <a:r>
-              <a:rPr lang="en-US" sz="2500" b="1" dirty="0">
-                <a:solidFill>
-                  <a:schemeClr val="bg1"/>
-                </a:solidFill>
-              </a:rPr>
-              <a:t>External to Service</a:t>
-            </a:r>
-            <a:endParaRPr lang="en-US" b="1" dirty="0">
+              <a:rPr lang="en-US" sz="2400" b="1" dirty="0">
+                <a:solidFill>
+                  <a:schemeClr val="bg1"/>
+                </a:solidFill>
+              </a:rPr>
+              <a:t>Small amount of sensitive data</a:t>
+            </a:r>
+          </a:p>
+          <a:p>
+            <a:r>
+              <a:rPr lang="en-US" sz="2400" b="1" dirty="0">
+                <a:solidFill>
+                  <a:schemeClr val="bg1"/>
+                </a:solidFill>
+              </a:rPr>
+              <a:t>	e.g. Passwords, tokens, keys </a:t>
+            </a:r>
+            <a:r>
+              <a:rPr lang="en-US" sz="2400" b="1" dirty="0" err="1">
+                <a:solidFill>
+                  <a:schemeClr val="bg1"/>
+                </a:solidFill>
+              </a:rPr>
+              <a:t>ect</a:t>
+            </a:r>
+            <a:endParaRPr lang="en-US" sz="2400" b="1" dirty="0">
+              <a:solidFill>
+                <a:schemeClr val="bg1"/>
+              </a:solidFill>
+            </a:endParaRPr>
+          </a:p>
+          <a:p>
+            <a:r>
+              <a:rPr lang="en-US" sz="2400" b="1" dirty="0">
+                <a:solidFill>
+                  <a:schemeClr val="bg1"/>
+                </a:solidFill>
+              </a:rPr>
+              <a:t>Reduce risk of exposing sensitive data</a:t>
+            </a:r>
+          </a:p>
+          <a:p>
+            <a:r>
+              <a:rPr lang="en-US" sz="2400" b="1" dirty="0">
+                <a:solidFill>
+                  <a:schemeClr val="bg1"/>
+                </a:solidFill>
+              </a:rPr>
+              <a:t>Created outside pods/containers.</a:t>
+            </a:r>
+          </a:p>
+          <a:p>
+            <a:r>
+              <a:rPr lang="en-US" sz="2400" b="1" dirty="0">
+                <a:solidFill>
+                  <a:schemeClr val="bg1"/>
+                </a:solidFill>
+              </a:rPr>
+              <a:t>	Can be used any number of times on Pod's </a:t>
+            </a:r>
+          </a:p>
+          <a:p>
+            <a:r>
+              <a:rPr lang="en-US" sz="2400" b="1" dirty="0">
+                <a:solidFill>
+                  <a:schemeClr val="bg1"/>
+                </a:solidFill>
+              </a:rPr>
+              <a:t>Stored inside ETCD database on K8s master</a:t>
+            </a:r>
+          </a:p>
+          <a:p>
+            <a:r>
+              <a:rPr lang="en-US" sz="2400" b="1" dirty="0">
+                <a:solidFill>
+                  <a:schemeClr val="bg1"/>
+                </a:solidFill>
+              </a:rPr>
+              <a:t>There is a limit to each secret size</a:t>
+            </a:r>
+          </a:p>
+          <a:p>
+            <a:r>
+              <a:rPr lang="en-US" sz="2400" b="1" dirty="0">
+                <a:solidFill>
+                  <a:schemeClr val="bg1"/>
+                </a:solidFill>
+              </a:rPr>
+              <a:t>	limit is 1MB</a:t>
+            </a:r>
+          </a:p>
+          <a:p>
+            <a:r>
+              <a:rPr lang="en-US" sz="2400" b="1" dirty="0">
+                <a:solidFill>
+                  <a:schemeClr val="bg1"/>
+                </a:solidFill>
+              </a:rPr>
+              <a:t>Loaded as </a:t>
+            </a:r>
+            <a:r>
+              <a:rPr lang="en-US" sz="2400" b="1" dirty="0" err="1">
+                <a:solidFill>
+                  <a:schemeClr val="bg1"/>
+                </a:solidFill>
+              </a:rPr>
+              <a:t>tempfs</a:t>
+            </a:r>
+            <a:r>
+              <a:rPr lang="en-US" sz="2400" b="1" dirty="0">
+                <a:solidFill>
+                  <a:schemeClr val="bg1"/>
+                </a:solidFill>
+              </a:rPr>
+              <a:t> and is available at a well defined location</a:t>
+            </a:r>
+          </a:p>
+          <a:p>
+            <a:endParaRPr lang="en-US" sz="2400" b="1" dirty="0">
               <a:solidFill>
                 <a:schemeClr val="bg1"/>
               </a:solidFill>
@@ -20752,7 +20749,7 @@
     </p:spTree>
     <p:extLst>
       <p:ext uri="{BB962C8B-B14F-4D97-AF65-F5344CB8AC3E}">
-        <p14:creationId xmlns:p14="http://schemas.microsoft.com/office/powerpoint/2010/main" val="1376410410"/>
+        <p14:creationId xmlns:p14="http://schemas.microsoft.com/office/powerpoint/2010/main" val="2758160368"/>
       </p:ext>
     </p:extLst>
   </p:cSld>
@@ -20817,7 +20814,7 @@
                   <a:schemeClr val="bg1"/>
                 </a:solidFill>
               </a:rPr>
-              <a:t>Container to Container Communication</a:t>
+              <a:t>Secrets</a:t>
             </a:r>
             <a:endParaRPr lang="en-IN" b="1" dirty="0">
               <a:solidFill>
@@ -20900,7 +20897,7 @@
         <p:spPr>
           <a:xfrm>
             <a:off x="965203" y="2065867"/>
-            <a:ext cx="10058399" cy="1200329"/>
+            <a:ext cx="10058399" cy="3046988"/>
           </a:xfrm>
           <a:prstGeom prst="rect">
             <a:avLst/>
@@ -20913,51 +20910,103 @@
           <a:lstStyle/>
           <a:p>
             <a:r>
-              <a:rPr lang="en-US" b="1" dirty="0">
-                <a:solidFill>
-                  <a:schemeClr val="bg1"/>
-                </a:solidFill>
-              </a:rPr>
-              <a:t>- Share the same network space   </a:t>
-            </a:r>
-          </a:p>
-          <a:p>
-            <a:r>
-              <a:rPr lang="en-US" b="1" dirty="0">
-                <a:solidFill>
-                  <a:schemeClr val="bg1"/>
-                </a:solidFill>
-              </a:rPr>
-              <a:t>- Highly coupled Pod</a:t>
-            </a:r>
-          </a:p>
-          <a:p>
-            <a:r>
-              <a:rPr lang="en-IN" b="1" dirty="0">
-                <a:solidFill>
-                  <a:schemeClr val="bg1"/>
-                </a:solidFill>
-              </a:rPr>
-              <a:t>- Localhost</a:t>
-            </a:r>
-          </a:p>
-          <a:p>
-            <a:pPr marL="285750" indent="-285750">
-              <a:buFontTx/>
-              <a:buChar char="-"/>
-            </a:pPr>
-            <a:endParaRPr lang="en-IN" b="1" dirty="0">
-              <a:solidFill>
-                <a:schemeClr val="bg1"/>
-              </a:solidFill>
-            </a:endParaRPr>
+              <a:rPr lang="en-US" sz="2400" b="1" dirty="0">
+                <a:solidFill>
+                  <a:schemeClr val="bg1"/>
+                </a:solidFill>
+              </a:rPr>
+              <a:t>Inject secrets into Pod's</a:t>
+            </a:r>
+          </a:p>
+          <a:p>
+            <a:r>
+              <a:rPr lang="en-US" sz="2400" b="1" dirty="0">
+                <a:solidFill>
+                  <a:schemeClr val="bg1"/>
+                </a:solidFill>
+              </a:rPr>
+              <a:t>	1. As Env. variables</a:t>
+            </a:r>
+          </a:p>
+          <a:p>
+            <a:r>
+              <a:rPr lang="en-US" sz="2400" b="1" dirty="0">
+                <a:solidFill>
+                  <a:schemeClr val="bg1"/>
+                </a:solidFill>
+              </a:rPr>
+              <a:t>	2. Volumes</a:t>
+            </a:r>
+          </a:p>
+          <a:p>
+            <a:r>
+              <a:rPr lang="en-US" sz="2400" b="1" dirty="0">
+                <a:solidFill>
+                  <a:schemeClr val="bg1"/>
+                </a:solidFill>
+              </a:rPr>
+              <a:t>	</a:t>
+            </a:r>
+          </a:p>
+          <a:p>
+            <a:r>
+              <a:rPr lang="en-US" sz="2400" b="1" dirty="0">
+                <a:solidFill>
+                  <a:schemeClr val="bg1"/>
+                </a:solidFill>
+              </a:rPr>
+              <a:t>Each secret is stored in </a:t>
+            </a:r>
+            <a:r>
+              <a:rPr lang="en-US" sz="2400" b="1" dirty="0" err="1">
+                <a:solidFill>
+                  <a:schemeClr val="bg1"/>
+                </a:solidFill>
+              </a:rPr>
+              <a:t>TempFS</a:t>
+            </a:r>
+            <a:r>
+              <a:rPr lang="en-US" sz="2400" b="1" dirty="0">
+                <a:solidFill>
+                  <a:schemeClr val="bg1"/>
+                </a:solidFill>
+              </a:rPr>
+              <a:t>.</a:t>
+            </a:r>
+          </a:p>
+          <a:p>
+            <a:r>
+              <a:rPr lang="en-US" sz="2400" b="1" dirty="0">
+                <a:solidFill>
+                  <a:schemeClr val="bg1"/>
+                </a:solidFill>
+              </a:rPr>
+              <a:t>	An application running in another container cannot access it.</a:t>
+            </a:r>
+          </a:p>
+          <a:p>
+            <a:endParaRPr lang="en-IN" sz="2400" b="1" dirty="0">
+              <a:solidFill>
+                <a:schemeClr val="bg1"/>
+              </a:solidFill>
+            </a:endParaRPr>
+          </a:p>
+          <a:p>
+            <a:r>
+              <a:rPr lang="en-IN" sz="2400" b="1" dirty="0">
+                <a:solidFill>
+                  <a:schemeClr val="bg1"/>
+                </a:solidFill>
+              </a:rPr>
+              <a:t>Control using RBAC</a:t>
+            </a:r>
           </a:p>
         </p:txBody>
       </p:sp>
     </p:spTree>
     <p:extLst>
       <p:ext uri="{BB962C8B-B14F-4D97-AF65-F5344CB8AC3E}">
-        <p14:creationId xmlns:p14="http://schemas.microsoft.com/office/powerpoint/2010/main" val="583697653"/>
+        <p14:creationId xmlns:p14="http://schemas.microsoft.com/office/powerpoint/2010/main" val="109962354"/>
       </p:ext>
     </p:extLst>
   </p:cSld>
@@ -21022,7 +21071,7 @@
                   <a:schemeClr val="bg1"/>
                 </a:solidFill>
               </a:rPr>
-              <a:t>Pod to Pod Communication</a:t>
+              <a:t>Secrets</a:t>
             </a:r>
             <a:endParaRPr lang="en-IN" b="1" dirty="0">
               <a:solidFill>
@@ -21104,8 +21153,8 @@
         </p:nvSpPr>
         <p:spPr>
           <a:xfrm>
-            <a:off x="939453" y="2038159"/>
-            <a:ext cx="10058399" cy="3416320"/>
+            <a:off x="965203" y="1534526"/>
+            <a:ext cx="10058399" cy="4893647"/>
           </a:xfrm>
           <a:prstGeom prst="rect">
             <a:avLst/>
@@ -21117,172 +21166,208 @@
           </a:bodyPr>
           <a:lstStyle/>
           <a:p>
-            <a:pPr marL="285750" indent="-285750">
-              <a:buFontTx/>
-              <a:buChar char="-"/>
-            </a:pPr>
-            <a:r>
-              <a:rPr lang="en-US" b="1" dirty="0">
-                <a:solidFill>
-                  <a:schemeClr val="bg1"/>
-                </a:solidFill>
-              </a:rPr>
-              <a:t>Pod’s have IP address</a:t>
-            </a:r>
-          </a:p>
-          <a:p>
-            <a:pPr marL="285750" indent="-285750">
-              <a:buFontTx/>
-              <a:buChar char="-"/>
-            </a:pPr>
-            <a:r>
-              <a:rPr lang="en-US" b="1" dirty="0">
-                <a:solidFill>
-                  <a:schemeClr val="bg1"/>
-                </a:solidFill>
-              </a:rPr>
-              <a:t>Containers with in Pod share the network namespace including IP.</a:t>
-            </a:r>
-          </a:p>
-          <a:p>
-            <a:pPr marL="285750" indent="-285750">
-              <a:buFontTx/>
-              <a:buChar char="-"/>
-            </a:pPr>
-            <a:r>
-              <a:rPr lang="en-US" b="1" dirty="0">
-                <a:solidFill>
-                  <a:schemeClr val="bg1"/>
-                </a:solidFill>
-              </a:rPr>
-              <a:t>Implemented by Network drivers</a:t>
-            </a:r>
-          </a:p>
-          <a:p>
-            <a:pPr marL="285750" indent="-285750">
-              <a:buFontTx/>
-              <a:buChar char="-"/>
-            </a:pPr>
-            <a:r>
-              <a:rPr lang="en-US" b="1" dirty="0">
-                <a:solidFill>
-                  <a:schemeClr val="bg1"/>
-                </a:solidFill>
-              </a:rPr>
-              <a:t>Rules</a:t>
-            </a:r>
-          </a:p>
-          <a:p>
-            <a:pPr marL="742950" lvl="1" indent="-285750">
-              <a:buFontTx/>
-              <a:buChar char="-"/>
-            </a:pPr>
-            <a:r>
-              <a:rPr lang="en-US" dirty="0"/>
-              <a:t>pods can communicate with all pods without NAT</a:t>
-            </a:r>
-            <a:endParaRPr lang="en-IN" b="1" dirty="0">
-              <a:solidFill>
-                <a:schemeClr val="bg1"/>
-              </a:solidFill>
-            </a:endParaRPr>
-          </a:p>
-          <a:p>
-            <a:pPr marL="742950" lvl="1" indent="-285750">
-              <a:buFontTx/>
-              <a:buChar char="-"/>
-            </a:pPr>
-            <a:r>
-              <a:rPr lang="en-US" dirty="0"/>
-              <a:t>agents on a node (e.g. system daemons, </a:t>
-            </a:r>
-            <a:r>
-              <a:rPr lang="en-US" dirty="0" err="1"/>
-              <a:t>kubelet</a:t>
-            </a:r>
-            <a:r>
-              <a:rPr lang="en-US" dirty="0"/>
-              <a:t>) can communicate with all pods</a:t>
-            </a:r>
-          </a:p>
-          <a:p>
-            <a:pPr marL="742950" lvl="1" indent="-285750">
-              <a:buFontTx/>
-              <a:buChar char="-"/>
-            </a:pPr>
-            <a:r>
-              <a:rPr lang="en-US" dirty="0"/>
-              <a:t>For platforms that support Pod running in host network (</a:t>
-            </a:r>
-            <a:r>
-              <a:rPr lang="en-US" dirty="0" err="1"/>
-              <a:t>linux</a:t>
-            </a:r>
-            <a:r>
-              <a:rPr lang="en-US" dirty="0"/>
-              <a:t>)</a:t>
-            </a:r>
-          </a:p>
-          <a:p>
-            <a:pPr marL="1200150" lvl="2" indent="-285750">
-              <a:buFontTx/>
-              <a:buChar char="-"/>
-            </a:pPr>
-            <a:r>
-              <a:rPr lang="en-US" dirty="0"/>
-              <a:t>pods in host network of node can communicate with all pods without NAT</a:t>
-            </a:r>
-            <a:endParaRPr lang="en-IN" b="1" dirty="0">
-              <a:solidFill>
-                <a:schemeClr val="bg1"/>
-              </a:solidFill>
-            </a:endParaRPr>
-          </a:p>
-          <a:p>
-            <a:pPr marL="285750" indent="-285750">
-              <a:buFontTx/>
-              <a:buChar char="-"/>
-            </a:pPr>
-            <a:r>
-              <a:rPr lang="en-IN" b="1" dirty="0">
-                <a:solidFill>
-                  <a:schemeClr val="bg1"/>
-                </a:solidFill>
-              </a:rPr>
-              <a:t>Simple and less friction model</a:t>
-            </a:r>
-          </a:p>
-          <a:p>
-            <a:pPr marL="285750" indent="-285750">
-              <a:buFontTx/>
-              <a:buChar char="-"/>
-            </a:pPr>
-            <a:r>
-              <a:rPr lang="en-IN" b="1" dirty="0">
-                <a:solidFill>
-                  <a:schemeClr val="bg1"/>
-                </a:solidFill>
-              </a:rPr>
-              <a:t>Containers should co-ordinate Port like how it happens on VM’s. IP-per-Pod model.</a:t>
-            </a:r>
-          </a:p>
-          <a:p>
-            <a:pPr marL="285750" indent="-285750">
-              <a:buFontTx/>
-              <a:buChar char="-"/>
-            </a:pPr>
-            <a:endParaRPr lang="en-IN" b="1" dirty="0">
-              <a:solidFill>
-                <a:schemeClr val="bg1"/>
-              </a:solidFill>
-            </a:endParaRPr>
-          </a:p>
-          <a:p>
-            <a:pPr marL="285750" indent="-285750">
-              <a:buFontTx/>
-              <a:buChar char="-"/>
-            </a:pPr>
-            <a:endParaRPr lang="en-IN" b="1" dirty="0">
+            <a:r>
+              <a:rPr lang="en-US" sz="2400" b="1" dirty="0">
+                <a:solidFill>
+                  <a:schemeClr val="bg1"/>
+                </a:solidFill>
+              </a:rPr>
+              <a:t>Two ways to create secrets</a:t>
+            </a:r>
+          </a:p>
+          <a:p>
+            <a:r>
+              <a:rPr lang="en-US" sz="2400" b="1" dirty="0">
+                <a:solidFill>
+                  <a:schemeClr val="bg1"/>
+                </a:solidFill>
+              </a:rPr>
+              <a:t>1. using </a:t>
+            </a:r>
+            <a:r>
+              <a:rPr lang="en-US" sz="2400" b="1" dirty="0" err="1">
+                <a:solidFill>
+                  <a:schemeClr val="bg1"/>
+                </a:solidFill>
+              </a:rPr>
+              <a:t>kubectl</a:t>
+            </a:r>
+            <a:endParaRPr lang="en-US" sz="2400" b="1" dirty="0">
+              <a:solidFill>
+                <a:schemeClr val="bg1"/>
+              </a:solidFill>
+            </a:endParaRPr>
+          </a:p>
+          <a:p>
+            <a:r>
+              <a:rPr lang="en-US" sz="2400" b="1" dirty="0">
+                <a:solidFill>
+                  <a:schemeClr val="bg1"/>
+                </a:solidFill>
+              </a:rPr>
+              <a:t>	- echo -n 'admin' &gt; ./username.txt</a:t>
+            </a:r>
+          </a:p>
+          <a:p>
+            <a:r>
+              <a:rPr lang="en-US" sz="2400" b="1" dirty="0">
+                <a:solidFill>
+                  <a:schemeClr val="bg1"/>
+                </a:solidFill>
+              </a:rPr>
+              <a:t>	- echo -n '</a:t>
+            </a:r>
+            <a:r>
+              <a:rPr lang="en-US" sz="2400" b="1" dirty="0" err="1">
+                <a:solidFill>
+                  <a:schemeClr val="bg1"/>
+                </a:solidFill>
+              </a:rPr>
+              <a:t>mypassword</a:t>
+            </a:r>
+            <a:r>
+              <a:rPr lang="en-US" sz="2400" b="1" dirty="0">
+                <a:solidFill>
+                  <a:schemeClr val="bg1"/>
+                </a:solidFill>
+              </a:rPr>
+              <a:t>' &gt; ./password.txt</a:t>
+            </a:r>
+          </a:p>
+          <a:p>
+            <a:r>
+              <a:rPr lang="en-US" sz="2400" b="1" dirty="0">
+                <a:solidFill>
+                  <a:schemeClr val="bg1"/>
+                </a:solidFill>
+              </a:rPr>
+              <a:t>		</a:t>
+            </a:r>
+          </a:p>
+          <a:p>
+            <a:r>
+              <a:rPr lang="en-US" sz="2400" b="1" dirty="0">
+                <a:solidFill>
+                  <a:schemeClr val="bg1"/>
+                </a:solidFill>
+              </a:rPr>
+              <a:t>	- </a:t>
+            </a:r>
+            <a:r>
+              <a:rPr lang="en-US" sz="2400" b="1" dirty="0" err="1">
+                <a:solidFill>
+                  <a:schemeClr val="bg1"/>
+                </a:solidFill>
+              </a:rPr>
+              <a:t>kubectl</a:t>
+            </a:r>
+            <a:r>
+              <a:rPr lang="en-US" sz="2400" b="1" dirty="0">
+                <a:solidFill>
+                  <a:schemeClr val="bg1"/>
+                </a:solidFill>
+              </a:rPr>
+              <a:t> create secret &lt;type&gt; &lt;name&gt; --from-file=&lt;user name filename&gt; --from-file=&lt;password file name&gt;</a:t>
+            </a:r>
+          </a:p>
+          <a:p>
+            <a:r>
+              <a:rPr lang="en-US" sz="2400" b="1" dirty="0">
+                <a:solidFill>
+                  <a:schemeClr val="bg1"/>
+                </a:solidFill>
+              </a:rPr>
+              <a:t>	e.g. </a:t>
+            </a:r>
+            <a:r>
+              <a:rPr lang="en-US" sz="2400" b="1" dirty="0" err="1">
+                <a:solidFill>
+                  <a:schemeClr val="bg1"/>
+                </a:solidFill>
+              </a:rPr>
+              <a:t>kubectl</a:t>
+            </a:r>
+            <a:r>
+              <a:rPr lang="en-US" sz="2400" b="1" dirty="0">
+                <a:solidFill>
+                  <a:schemeClr val="bg1"/>
+                </a:solidFill>
+              </a:rPr>
+              <a:t> create secret generic user-pass --from-file=./username.txt --from-file=./password.txt</a:t>
+            </a:r>
+          </a:p>
+          <a:p>
+            <a:r>
+              <a:rPr lang="en-US" sz="2400" b="1" dirty="0">
+                <a:solidFill>
+                  <a:schemeClr val="bg1"/>
+                </a:solidFill>
+              </a:rPr>
+              <a:t>		</a:t>
+            </a:r>
+          </a:p>
+          <a:p>
+            <a:r>
+              <a:rPr lang="en-US" sz="2400" b="1" dirty="0">
+                <a:solidFill>
+                  <a:schemeClr val="bg1"/>
+                </a:solidFill>
+              </a:rPr>
+              <a:t>	- </a:t>
+            </a:r>
+            <a:r>
+              <a:rPr lang="en-US" sz="2400" b="1" dirty="0" err="1">
+                <a:solidFill>
+                  <a:schemeClr val="bg1"/>
+                </a:solidFill>
+              </a:rPr>
+              <a:t>kubectl</a:t>
+            </a:r>
+            <a:r>
+              <a:rPr lang="en-US" sz="2400" b="1" dirty="0">
+                <a:solidFill>
+                  <a:schemeClr val="bg1"/>
+                </a:solidFill>
+              </a:rPr>
+              <a:t> get secrets</a:t>
+            </a:r>
+          </a:p>
+          <a:p>
+            <a:r>
+              <a:rPr lang="en-US" sz="2400" b="1" dirty="0">
+                <a:solidFill>
+                  <a:schemeClr val="bg1"/>
+                </a:solidFill>
+              </a:rPr>
+              <a:t>	- </a:t>
+            </a:r>
+            <a:r>
+              <a:rPr lang="en-US" sz="2400" b="1" dirty="0" err="1">
+                <a:solidFill>
+                  <a:schemeClr val="bg1"/>
+                </a:solidFill>
+              </a:rPr>
+              <a:t>kubectl</a:t>
+            </a:r>
+            <a:r>
+              <a:rPr lang="en-US" sz="2400" b="1" dirty="0">
+                <a:solidFill>
+                  <a:schemeClr val="bg1"/>
+                </a:solidFill>
+              </a:rPr>
+              <a:t> describe secret user-pass</a:t>
+            </a:r>
+          </a:p>
+          <a:p>
+            <a:r>
+              <a:rPr lang="en-US" sz="2400" b="1" dirty="0">
+                <a:solidFill>
+                  <a:schemeClr val="bg1"/>
+                </a:solidFill>
+              </a:rPr>
+              <a:t>		- username and password is not displayed.</a:t>
+            </a:r>
+            <a:endParaRPr lang="en-IN" sz="2400" b="1" dirty="0">
               <a:solidFill>
                 <a:schemeClr val="bg1"/>
               </a:solidFill>
@@ -21293,7 +21378,7 @@
     </p:spTree>
     <p:extLst>
       <p:ext uri="{BB962C8B-B14F-4D97-AF65-F5344CB8AC3E}">
-        <p14:creationId xmlns:p14="http://schemas.microsoft.com/office/powerpoint/2010/main" val="1915203204"/>
+        <p14:creationId xmlns:p14="http://schemas.microsoft.com/office/powerpoint/2010/main" val="2345057243"/>
       </p:ext>
     </p:extLst>
   </p:cSld>
@@ -21572,6 +21657,1799 @@
                   <a:schemeClr val="bg1"/>
                 </a:solidFill>
               </a:rPr>
+              <a:t>Secrets</a:t>
+            </a:r>
+            <a:endParaRPr lang="en-IN" b="1" dirty="0">
+              <a:solidFill>
+                <a:schemeClr val="bg1"/>
+              </a:solidFill>
+              <a:latin typeface="+mn-lt"/>
+              <a:ea typeface="+mn-ea"/>
+              <a:cs typeface="+mn-cs"/>
+            </a:endParaRPr>
+          </a:p>
+        </p:txBody>
+      </p:sp>
+      <p:sp>
+        <p:nvSpPr>
+          <p:cNvPr id="6" name="Rectangle 5">
+            <a:extLst>
+              <a:ext uri="{FF2B5EF4-FFF2-40B4-BE49-F238E27FC236}">
+                <a16:creationId xmlns:a16="http://schemas.microsoft.com/office/drawing/2014/main" id="{1AFE4F34-8260-4EB6-8248-06315F2B803F}"/>
+              </a:ext>
+            </a:extLst>
+          </p:cNvPr>
+          <p:cNvSpPr/>
+          <p:nvPr/>
+        </p:nvSpPr>
+        <p:spPr>
+          <a:xfrm>
+            <a:off x="939453" y="1903956"/>
+            <a:ext cx="11273420" cy="3895595"/>
+          </a:xfrm>
+          <a:prstGeom prst="rect">
+            <a:avLst/>
+          </a:prstGeom>
+        </p:spPr>
+        <p:txBody>
+          <a:bodyPr wrap="square">
+            <a:noAutofit/>
+          </a:bodyPr>
+          <a:lstStyle/>
+          <a:p>
+            <a:pPr marL="457200" indent="-457200">
+              <a:buFontTx/>
+              <a:buChar char="-"/>
+            </a:pPr>
+            <a:endParaRPr lang="en-US" sz="2600" b="1" dirty="0">
+              <a:solidFill>
+                <a:schemeClr val="bg1"/>
+              </a:solidFill>
+            </a:endParaRPr>
+          </a:p>
+          <a:p>
+            <a:pPr marL="457200" indent="-457200">
+              <a:buFontTx/>
+              <a:buChar char="-"/>
+            </a:pPr>
+            <a:endParaRPr lang="en-US" sz="2600" b="1" dirty="0">
+              <a:solidFill>
+                <a:schemeClr val="bg1"/>
+              </a:solidFill>
+            </a:endParaRPr>
+          </a:p>
+          <a:p>
+            <a:pPr marL="457200" indent="-457200">
+              <a:buFontTx/>
+              <a:buChar char="-"/>
+            </a:pPr>
+            <a:endParaRPr lang="en-US" sz="2600" b="1" dirty="0">
+              <a:solidFill>
+                <a:schemeClr val="bg1"/>
+              </a:solidFill>
+            </a:endParaRPr>
+          </a:p>
+        </p:txBody>
+      </p:sp>
+      <p:sp>
+        <p:nvSpPr>
+          <p:cNvPr id="3" name="Rectangle 2"/>
+          <p:cNvSpPr/>
+          <p:nvPr/>
+        </p:nvSpPr>
+        <p:spPr>
+          <a:xfrm>
+            <a:off x="965203" y="2065867"/>
+            <a:ext cx="10058399" cy="2308324"/>
+          </a:xfrm>
+          <a:prstGeom prst="rect">
+            <a:avLst/>
+          </a:prstGeom>
+        </p:spPr>
+        <p:txBody>
+          <a:bodyPr wrap="square">
+            <a:spAutoFit/>
+          </a:bodyPr>
+          <a:lstStyle/>
+          <a:p>
+            <a:r>
+              <a:rPr lang="en-US" sz="2400" b="1" dirty="0">
+                <a:solidFill>
+                  <a:schemeClr val="bg1"/>
+                </a:solidFill>
+              </a:rPr>
+              <a:t>2. using manifest file (manually)</a:t>
+            </a:r>
+          </a:p>
+          <a:p>
+            <a:r>
+              <a:rPr lang="en-US" sz="2400" b="1" dirty="0">
+                <a:solidFill>
+                  <a:schemeClr val="bg1"/>
+                </a:solidFill>
+              </a:rPr>
+              <a:t>	This will also cover injecting secrets through volume.</a:t>
+            </a:r>
+          </a:p>
+          <a:p>
+            <a:r>
+              <a:rPr lang="en-US" sz="2400" b="1" dirty="0">
+                <a:solidFill>
+                  <a:schemeClr val="bg1"/>
+                </a:solidFill>
+              </a:rPr>
+              <a:t>	- echo -n 'admin' | base64</a:t>
+            </a:r>
+          </a:p>
+          <a:p>
+            <a:r>
+              <a:rPr lang="en-US" sz="2400" b="1" dirty="0">
+                <a:solidFill>
+                  <a:schemeClr val="bg1"/>
+                </a:solidFill>
+              </a:rPr>
+              <a:t>	- echo -n 'password123' | base64</a:t>
+            </a:r>
+          </a:p>
+          <a:p>
+            <a:r>
+              <a:rPr lang="en-US" sz="2400" b="1" dirty="0">
+                <a:solidFill>
+                  <a:schemeClr val="bg1"/>
+                </a:solidFill>
+              </a:rPr>
+              <a:t>	- refer </a:t>
+            </a:r>
+            <a:r>
+              <a:rPr lang="en-US" sz="2400" b="1" dirty="0" err="1">
+                <a:solidFill>
+                  <a:schemeClr val="bg1"/>
+                </a:solidFill>
+              </a:rPr>
+              <a:t>secrets.yaml</a:t>
+            </a:r>
+            <a:r>
+              <a:rPr lang="en-US" sz="2400" b="1" dirty="0">
+                <a:solidFill>
+                  <a:schemeClr val="bg1"/>
+                </a:solidFill>
+              </a:rPr>
+              <a:t> and apply it</a:t>
+            </a:r>
+          </a:p>
+          <a:p>
+            <a:r>
+              <a:rPr lang="en-US" sz="2400" b="1" dirty="0">
+                <a:solidFill>
+                  <a:schemeClr val="bg1"/>
+                </a:solidFill>
+              </a:rPr>
+              <a:t>	- </a:t>
+            </a:r>
+            <a:r>
+              <a:rPr lang="en-US" sz="2400" b="1" dirty="0" err="1">
+                <a:solidFill>
+                  <a:schemeClr val="bg1"/>
+                </a:solidFill>
+              </a:rPr>
+              <a:t>kubectl</a:t>
+            </a:r>
+            <a:r>
+              <a:rPr lang="en-US" sz="2400" b="1" dirty="0">
+                <a:solidFill>
+                  <a:schemeClr val="bg1"/>
+                </a:solidFill>
+              </a:rPr>
+              <a:t> get secrets</a:t>
+            </a:r>
+          </a:p>
+        </p:txBody>
+      </p:sp>
+    </p:spTree>
+    <p:extLst>
+      <p:ext uri="{BB962C8B-B14F-4D97-AF65-F5344CB8AC3E}">
+        <p14:creationId xmlns:p14="http://schemas.microsoft.com/office/powerpoint/2010/main" val="155827125"/>
+      </p:ext>
+    </p:extLst>
+  </p:cSld>
+  <p:clrMapOvr>
+    <a:masterClrMapping/>
+  </p:clrMapOvr>
+</p:sld>
+</file>
+
+<file path=ppt/slides/slide71.xml><?xml version="1.0" encoding="utf-8"?>
+<p:sld xmlns:a="http://schemas.openxmlformats.org/drawingml/2006/main" xmlns:r="http://schemas.openxmlformats.org/officeDocument/2006/relationships" xmlns:p="http://schemas.openxmlformats.org/presentationml/2006/main">
+  <p:cSld>
+    <p:bg>
+      <p:bgPr>
+        <a:solidFill>
+          <a:schemeClr val="tx2">
+            <a:lumMod val="60000"/>
+            <a:lumOff val="40000"/>
+          </a:schemeClr>
+        </a:solidFill>
+        <a:effectLst/>
+      </p:bgPr>
+    </p:bg>
+    <p:spTree>
+      <p:nvGrpSpPr>
+        <p:cNvPr id="1" name=""/>
+        <p:cNvGrpSpPr/>
+        <p:nvPr/>
+      </p:nvGrpSpPr>
+      <p:grpSpPr>
+        <a:xfrm>
+          <a:off x="0" y="0"/>
+          <a:ext cx="0" cy="0"/>
+          <a:chOff x="0" y="0"/>
+          <a:chExt cx="0" cy="0"/>
+        </a:xfrm>
+      </p:grpSpPr>
+      <p:sp>
+        <p:nvSpPr>
+          <p:cNvPr id="2" name="Title 1">
+            <a:extLst>
+              <a:ext uri="{FF2B5EF4-FFF2-40B4-BE49-F238E27FC236}">
+                <a16:creationId xmlns:a16="http://schemas.microsoft.com/office/drawing/2014/main" id="{C5D36DB0-7732-4EB3-9925-FA6BC1656477}"/>
+              </a:ext>
+            </a:extLst>
+          </p:cNvPr>
+          <p:cNvSpPr>
+            <a:spLocks noGrp="1"/>
+          </p:cNvSpPr>
+          <p:nvPr>
+            <p:ph type="title"/>
+          </p:nvPr>
+        </p:nvSpPr>
+        <p:spPr/>
+        <p:txBody>
+          <a:bodyPr/>
+          <a:lstStyle/>
+          <a:p>
+            <a:r>
+              <a:rPr lang="en-US" b="1" dirty="0">
+                <a:solidFill>
+                  <a:schemeClr val="bg1"/>
+                </a:solidFill>
+              </a:rPr>
+              <a:t>Secrets</a:t>
+            </a:r>
+            <a:endParaRPr lang="en-IN" b="1" dirty="0">
+              <a:solidFill>
+                <a:schemeClr val="bg1"/>
+              </a:solidFill>
+              <a:latin typeface="+mn-lt"/>
+              <a:ea typeface="+mn-ea"/>
+              <a:cs typeface="+mn-cs"/>
+            </a:endParaRPr>
+          </a:p>
+        </p:txBody>
+      </p:sp>
+      <p:sp>
+        <p:nvSpPr>
+          <p:cNvPr id="6" name="Rectangle 5">
+            <a:extLst>
+              <a:ext uri="{FF2B5EF4-FFF2-40B4-BE49-F238E27FC236}">
+                <a16:creationId xmlns:a16="http://schemas.microsoft.com/office/drawing/2014/main" id="{1AFE4F34-8260-4EB6-8248-06315F2B803F}"/>
+              </a:ext>
+            </a:extLst>
+          </p:cNvPr>
+          <p:cNvSpPr/>
+          <p:nvPr/>
+        </p:nvSpPr>
+        <p:spPr>
+          <a:xfrm>
+            <a:off x="939453" y="1903956"/>
+            <a:ext cx="11273420" cy="3895595"/>
+          </a:xfrm>
+          <a:prstGeom prst="rect">
+            <a:avLst/>
+          </a:prstGeom>
+        </p:spPr>
+        <p:txBody>
+          <a:bodyPr wrap="square">
+            <a:noAutofit/>
+          </a:bodyPr>
+          <a:lstStyle/>
+          <a:p>
+            <a:pPr marL="457200" indent="-457200">
+              <a:buFontTx/>
+              <a:buChar char="-"/>
+            </a:pPr>
+            <a:endParaRPr lang="en-US" sz="2600" b="1" dirty="0">
+              <a:solidFill>
+                <a:schemeClr val="bg1"/>
+              </a:solidFill>
+            </a:endParaRPr>
+          </a:p>
+          <a:p>
+            <a:pPr marL="457200" indent="-457200">
+              <a:buFontTx/>
+              <a:buChar char="-"/>
+            </a:pPr>
+            <a:endParaRPr lang="en-US" sz="2600" b="1" dirty="0">
+              <a:solidFill>
+                <a:schemeClr val="bg1"/>
+              </a:solidFill>
+            </a:endParaRPr>
+          </a:p>
+          <a:p>
+            <a:pPr marL="457200" indent="-457200">
+              <a:buFontTx/>
+              <a:buChar char="-"/>
+            </a:pPr>
+            <a:endParaRPr lang="en-US" sz="2600" b="1" dirty="0">
+              <a:solidFill>
+                <a:schemeClr val="bg1"/>
+              </a:solidFill>
+            </a:endParaRPr>
+          </a:p>
+        </p:txBody>
+      </p:sp>
+      <p:sp>
+        <p:nvSpPr>
+          <p:cNvPr id="3" name="Rectangle 2"/>
+          <p:cNvSpPr/>
+          <p:nvPr/>
+        </p:nvSpPr>
+        <p:spPr>
+          <a:xfrm>
+            <a:off x="965203" y="2065867"/>
+            <a:ext cx="10058399" cy="3416320"/>
+          </a:xfrm>
+          <a:prstGeom prst="rect">
+            <a:avLst/>
+          </a:prstGeom>
+        </p:spPr>
+        <p:txBody>
+          <a:bodyPr wrap="square">
+            <a:spAutoFit/>
+          </a:bodyPr>
+          <a:lstStyle/>
+          <a:p>
+            <a:r>
+              <a:rPr lang="en-US" sz="2400" b="1" dirty="0">
+                <a:solidFill>
+                  <a:schemeClr val="bg1"/>
+                </a:solidFill>
+              </a:rPr>
+              <a:t>Inject secrets through volume</a:t>
+            </a:r>
+          </a:p>
+          <a:p>
+            <a:r>
+              <a:rPr lang="en-US" sz="2400" b="1" dirty="0">
+                <a:solidFill>
+                  <a:schemeClr val="bg1"/>
+                </a:solidFill>
+              </a:rPr>
+              <a:t>	- refer secret-</a:t>
+            </a:r>
+            <a:r>
+              <a:rPr lang="en-US" sz="2400" b="1" dirty="0" err="1">
+                <a:solidFill>
+                  <a:schemeClr val="bg1"/>
+                </a:solidFill>
+              </a:rPr>
+              <a:t>use.yaml</a:t>
+            </a:r>
+            <a:r>
+              <a:rPr lang="en-US" sz="2400" b="1" dirty="0">
+                <a:solidFill>
+                  <a:schemeClr val="bg1"/>
+                </a:solidFill>
+              </a:rPr>
+              <a:t> and apply it </a:t>
+            </a:r>
+          </a:p>
+          <a:p>
+            <a:r>
+              <a:rPr lang="en-US" sz="2400" b="1" dirty="0">
+                <a:solidFill>
+                  <a:schemeClr val="bg1"/>
+                </a:solidFill>
+              </a:rPr>
+              <a:t>	- </a:t>
+            </a:r>
+            <a:r>
+              <a:rPr lang="en-US" sz="2400" b="1" dirty="0" err="1">
+                <a:solidFill>
+                  <a:schemeClr val="bg1"/>
+                </a:solidFill>
+              </a:rPr>
+              <a:t>kubectl</a:t>
+            </a:r>
+            <a:r>
+              <a:rPr lang="en-US" sz="2400" b="1" dirty="0">
+                <a:solidFill>
+                  <a:schemeClr val="bg1"/>
+                </a:solidFill>
+              </a:rPr>
+              <a:t> get pods</a:t>
+            </a:r>
+          </a:p>
+          <a:p>
+            <a:r>
+              <a:rPr lang="en-US" sz="2400" b="1" dirty="0">
+                <a:solidFill>
+                  <a:schemeClr val="bg1"/>
+                </a:solidFill>
+              </a:rPr>
+              <a:t>		- </a:t>
+            </a:r>
+            <a:r>
+              <a:rPr lang="en-US" sz="2400" b="1" dirty="0" err="1">
+                <a:solidFill>
+                  <a:schemeClr val="bg1"/>
+                </a:solidFill>
+              </a:rPr>
+              <a:t>kubectl</a:t>
+            </a:r>
+            <a:r>
+              <a:rPr lang="en-US" sz="2400" b="1" dirty="0">
+                <a:solidFill>
+                  <a:schemeClr val="bg1"/>
+                </a:solidFill>
+              </a:rPr>
+              <a:t> exec &lt;pod&gt; -it /bin/</a:t>
+            </a:r>
+            <a:r>
+              <a:rPr lang="en-US" sz="2400" b="1" dirty="0" err="1">
+                <a:solidFill>
+                  <a:schemeClr val="bg1"/>
+                </a:solidFill>
+              </a:rPr>
+              <a:t>sh</a:t>
+            </a:r>
+            <a:endParaRPr lang="en-US" sz="2400" b="1" dirty="0">
+              <a:solidFill>
+                <a:schemeClr val="bg1"/>
+              </a:solidFill>
+            </a:endParaRPr>
+          </a:p>
+          <a:p>
+            <a:r>
+              <a:rPr lang="en-US" sz="2400" b="1" dirty="0">
+                <a:solidFill>
+                  <a:schemeClr val="bg1"/>
+                </a:solidFill>
+              </a:rPr>
+              <a:t>		- cd /</a:t>
+            </a:r>
+            <a:r>
+              <a:rPr lang="en-US" sz="2400" b="1" dirty="0" err="1">
+                <a:solidFill>
+                  <a:schemeClr val="bg1"/>
+                </a:solidFill>
+              </a:rPr>
+              <a:t>etc</a:t>
+            </a:r>
+            <a:r>
+              <a:rPr lang="en-US" sz="2400" b="1" dirty="0">
+                <a:solidFill>
+                  <a:schemeClr val="bg1"/>
+                </a:solidFill>
+              </a:rPr>
+              <a:t>/foo</a:t>
+            </a:r>
+          </a:p>
+          <a:p>
+            <a:r>
+              <a:rPr lang="en-US" sz="2400" b="1" dirty="0">
+                <a:solidFill>
+                  <a:schemeClr val="bg1"/>
+                </a:solidFill>
+              </a:rPr>
+              <a:t>		- cat user</a:t>
+            </a:r>
+          </a:p>
+          <a:p>
+            <a:r>
+              <a:rPr lang="en-US" sz="2400" b="1" dirty="0">
+                <a:solidFill>
+                  <a:schemeClr val="bg1"/>
+                </a:solidFill>
+              </a:rPr>
+              <a:t>		- cat password</a:t>
+            </a:r>
+          </a:p>
+          <a:p>
+            <a:r>
+              <a:rPr lang="en-US" sz="2400" b="1" dirty="0">
+                <a:solidFill>
+                  <a:schemeClr val="bg1"/>
+                </a:solidFill>
+              </a:rPr>
+              <a:t>		- Username and password were passed in encrypted format is available in plain text.</a:t>
+            </a:r>
+            <a:endParaRPr lang="en-IN" sz="2400" b="1" dirty="0">
+              <a:solidFill>
+                <a:schemeClr val="bg1"/>
+              </a:solidFill>
+            </a:endParaRPr>
+          </a:p>
+        </p:txBody>
+      </p:sp>
+    </p:spTree>
+    <p:extLst>
+      <p:ext uri="{BB962C8B-B14F-4D97-AF65-F5344CB8AC3E}">
+        <p14:creationId xmlns:p14="http://schemas.microsoft.com/office/powerpoint/2010/main" val="1737697713"/>
+      </p:ext>
+    </p:extLst>
+  </p:cSld>
+  <p:clrMapOvr>
+    <a:masterClrMapping/>
+  </p:clrMapOvr>
+</p:sld>
+</file>
+
+<file path=ppt/slides/slide72.xml><?xml version="1.0" encoding="utf-8"?>
+<p:sld xmlns:a="http://schemas.openxmlformats.org/drawingml/2006/main" xmlns:r="http://schemas.openxmlformats.org/officeDocument/2006/relationships" xmlns:p="http://schemas.openxmlformats.org/presentationml/2006/main">
+  <p:cSld>
+    <p:bg>
+      <p:bgPr>
+        <a:solidFill>
+          <a:schemeClr val="tx2">
+            <a:lumMod val="60000"/>
+            <a:lumOff val="40000"/>
+          </a:schemeClr>
+        </a:solidFill>
+        <a:effectLst/>
+      </p:bgPr>
+    </p:bg>
+    <p:spTree>
+      <p:nvGrpSpPr>
+        <p:cNvPr id="1" name=""/>
+        <p:cNvGrpSpPr/>
+        <p:nvPr/>
+      </p:nvGrpSpPr>
+      <p:grpSpPr>
+        <a:xfrm>
+          <a:off x="0" y="0"/>
+          <a:ext cx="0" cy="0"/>
+          <a:chOff x="0" y="0"/>
+          <a:chExt cx="0" cy="0"/>
+        </a:xfrm>
+      </p:grpSpPr>
+      <p:sp>
+        <p:nvSpPr>
+          <p:cNvPr id="2" name="Title 1">
+            <a:extLst>
+              <a:ext uri="{FF2B5EF4-FFF2-40B4-BE49-F238E27FC236}">
+                <a16:creationId xmlns:a16="http://schemas.microsoft.com/office/drawing/2014/main" id="{C5D36DB0-7732-4EB3-9925-FA6BC1656477}"/>
+              </a:ext>
+            </a:extLst>
+          </p:cNvPr>
+          <p:cNvSpPr>
+            <a:spLocks noGrp="1"/>
+          </p:cNvSpPr>
+          <p:nvPr>
+            <p:ph type="title"/>
+          </p:nvPr>
+        </p:nvSpPr>
+        <p:spPr/>
+        <p:txBody>
+          <a:bodyPr/>
+          <a:lstStyle/>
+          <a:p>
+            <a:r>
+              <a:rPr lang="en-US" b="1" dirty="0">
+                <a:solidFill>
+                  <a:schemeClr val="bg1"/>
+                </a:solidFill>
+              </a:rPr>
+              <a:t>Secrets</a:t>
+            </a:r>
+            <a:endParaRPr lang="en-IN" b="1" dirty="0">
+              <a:solidFill>
+                <a:schemeClr val="bg1"/>
+              </a:solidFill>
+              <a:latin typeface="+mn-lt"/>
+              <a:ea typeface="+mn-ea"/>
+              <a:cs typeface="+mn-cs"/>
+            </a:endParaRPr>
+          </a:p>
+        </p:txBody>
+      </p:sp>
+      <p:sp>
+        <p:nvSpPr>
+          <p:cNvPr id="6" name="Rectangle 5">
+            <a:extLst>
+              <a:ext uri="{FF2B5EF4-FFF2-40B4-BE49-F238E27FC236}">
+                <a16:creationId xmlns:a16="http://schemas.microsoft.com/office/drawing/2014/main" id="{1AFE4F34-8260-4EB6-8248-06315F2B803F}"/>
+              </a:ext>
+            </a:extLst>
+          </p:cNvPr>
+          <p:cNvSpPr/>
+          <p:nvPr/>
+        </p:nvSpPr>
+        <p:spPr>
+          <a:xfrm>
+            <a:off x="939453" y="1903956"/>
+            <a:ext cx="11273420" cy="3895595"/>
+          </a:xfrm>
+          <a:prstGeom prst="rect">
+            <a:avLst/>
+          </a:prstGeom>
+        </p:spPr>
+        <p:txBody>
+          <a:bodyPr wrap="square">
+            <a:noAutofit/>
+          </a:bodyPr>
+          <a:lstStyle/>
+          <a:p>
+            <a:pPr marL="457200" indent="-457200">
+              <a:buFontTx/>
+              <a:buChar char="-"/>
+            </a:pPr>
+            <a:endParaRPr lang="en-US" sz="2600" b="1" dirty="0">
+              <a:solidFill>
+                <a:schemeClr val="bg1"/>
+              </a:solidFill>
+            </a:endParaRPr>
+          </a:p>
+          <a:p>
+            <a:pPr marL="457200" indent="-457200">
+              <a:buFontTx/>
+              <a:buChar char="-"/>
+            </a:pPr>
+            <a:endParaRPr lang="en-US" sz="2600" b="1" dirty="0">
+              <a:solidFill>
+                <a:schemeClr val="bg1"/>
+              </a:solidFill>
+            </a:endParaRPr>
+          </a:p>
+          <a:p>
+            <a:pPr marL="457200" indent="-457200">
+              <a:buFontTx/>
+              <a:buChar char="-"/>
+            </a:pPr>
+            <a:endParaRPr lang="en-US" sz="2600" b="1" dirty="0">
+              <a:solidFill>
+                <a:schemeClr val="bg1"/>
+              </a:solidFill>
+            </a:endParaRPr>
+          </a:p>
+        </p:txBody>
+      </p:sp>
+      <p:sp>
+        <p:nvSpPr>
+          <p:cNvPr id="3" name="Rectangle 2"/>
+          <p:cNvSpPr/>
+          <p:nvPr/>
+        </p:nvSpPr>
+        <p:spPr>
+          <a:xfrm>
+            <a:off x="965203" y="1275029"/>
+            <a:ext cx="10058399" cy="5632311"/>
+          </a:xfrm>
+          <a:prstGeom prst="rect">
+            <a:avLst/>
+          </a:prstGeom>
+        </p:spPr>
+        <p:txBody>
+          <a:bodyPr wrap="square">
+            <a:spAutoFit/>
+          </a:bodyPr>
+          <a:lstStyle/>
+          <a:p>
+            <a:r>
+              <a:rPr lang="en-US" sz="2400" b="1" dirty="0">
+                <a:solidFill>
+                  <a:schemeClr val="bg1"/>
+                </a:solidFill>
+              </a:rPr>
+              <a:t>Types of secret can be any of the following</a:t>
+            </a:r>
+          </a:p>
+          <a:p>
+            <a:r>
+              <a:rPr lang="en-US" sz="2400" b="1" dirty="0">
+                <a:solidFill>
+                  <a:schemeClr val="bg1"/>
+                </a:solidFill>
+              </a:rPr>
+              <a:t>  	- generic</a:t>
+            </a:r>
+          </a:p>
+          <a:p>
+            <a:r>
+              <a:rPr lang="en-US" sz="2400" b="1" dirty="0">
+                <a:solidFill>
+                  <a:schemeClr val="bg1"/>
+                </a:solidFill>
+              </a:rPr>
+              <a:t>		1. File #most used</a:t>
+            </a:r>
+          </a:p>
+          <a:p>
+            <a:r>
+              <a:rPr lang="en-US" sz="2400" b="1" dirty="0">
+                <a:solidFill>
+                  <a:schemeClr val="bg1"/>
+                </a:solidFill>
+              </a:rPr>
+              <a:t>		2. Directory</a:t>
+            </a:r>
+          </a:p>
+          <a:p>
+            <a:r>
+              <a:rPr lang="en-US" sz="2400" b="1" dirty="0">
+                <a:solidFill>
+                  <a:schemeClr val="bg1"/>
+                </a:solidFill>
+              </a:rPr>
+              <a:t>		3. Literal value</a:t>
+            </a:r>
+          </a:p>
+          <a:p>
+            <a:r>
+              <a:rPr lang="en-US" sz="2400" b="1" dirty="0">
+                <a:solidFill>
+                  <a:schemeClr val="bg1"/>
+                </a:solidFill>
+              </a:rPr>
+              <a:t>  	- docker-registry</a:t>
+            </a:r>
+          </a:p>
+          <a:p>
+            <a:r>
+              <a:rPr lang="en-US" sz="2400" b="1" dirty="0">
+                <a:solidFill>
+                  <a:schemeClr val="bg1"/>
+                </a:solidFill>
+              </a:rPr>
+              <a:t>  	- </a:t>
+            </a:r>
+            <a:r>
+              <a:rPr lang="en-US" sz="2400" b="1" dirty="0" err="1">
+                <a:solidFill>
+                  <a:schemeClr val="bg1"/>
+                </a:solidFill>
+              </a:rPr>
+              <a:t>tls</a:t>
+            </a:r>
+            <a:endParaRPr lang="en-US" sz="2400" b="1" dirty="0">
+              <a:solidFill>
+                <a:schemeClr val="bg1"/>
+              </a:solidFill>
+            </a:endParaRPr>
+          </a:p>
+          <a:p>
+            <a:r>
+              <a:rPr lang="en-US" sz="2400" b="1" dirty="0">
+                <a:solidFill>
+                  <a:schemeClr val="bg1"/>
+                </a:solidFill>
+              </a:rPr>
+              <a:t>  </a:t>
+            </a:r>
+          </a:p>
+          <a:p>
+            <a:r>
+              <a:rPr lang="en-US" sz="2400" b="1" dirty="0">
+                <a:solidFill>
+                  <a:schemeClr val="bg1"/>
+                </a:solidFill>
+              </a:rPr>
+              <a:t>Injecting secrets through environment variable.</a:t>
+            </a:r>
+          </a:p>
+          <a:p>
+            <a:r>
+              <a:rPr lang="en-US" sz="2400" b="1" dirty="0">
+                <a:solidFill>
+                  <a:schemeClr val="bg1"/>
+                </a:solidFill>
+              </a:rPr>
+              <a:t>	- ensure that </a:t>
+            </a:r>
+            <a:r>
+              <a:rPr lang="en-US" sz="2400" b="1" dirty="0" err="1">
+                <a:solidFill>
+                  <a:schemeClr val="bg1"/>
+                </a:solidFill>
+              </a:rPr>
+              <a:t>mysecret</a:t>
+            </a:r>
+            <a:r>
+              <a:rPr lang="en-US" sz="2400" b="1" dirty="0">
+                <a:solidFill>
+                  <a:schemeClr val="bg1"/>
+                </a:solidFill>
+              </a:rPr>
+              <a:t> was not deleted</a:t>
+            </a:r>
+          </a:p>
+          <a:p>
+            <a:r>
+              <a:rPr lang="en-US" sz="2400" b="1" dirty="0">
+                <a:solidFill>
+                  <a:schemeClr val="bg1"/>
+                </a:solidFill>
+              </a:rPr>
+              <a:t>	- </a:t>
+            </a:r>
+            <a:r>
+              <a:rPr lang="en-US" sz="2400" b="1" dirty="0" err="1">
+                <a:solidFill>
+                  <a:schemeClr val="bg1"/>
+                </a:solidFill>
+              </a:rPr>
+              <a:t>kubectl</a:t>
+            </a:r>
+            <a:r>
+              <a:rPr lang="en-US" sz="2400" b="1" dirty="0">
+                <a:solidFill>
+                  <a:schemeClr val="bg1"/>
+                </a:solidFill>
+              </a:rPr>
+              <a:t> apply -f secrets-env-</a:t>
+            </a:r>
+            <a:r>
+              <a:rPr lang="en-US" sz="2400" b="1" dirty="0" err="1">
+                <a:solidFill>
+                  <a:schemeClr val="bg1"/>
+                </a:solidFill>
+              </a:rPr>
+              <a:t>pod.yaml</a:t>
+            </a:r>
+            <a:endParaRPr lang="en-US" sz="2400" b="1" dirty="0">
+              <a:solidFill>
+                <a:schemeClr val="bg1"/>
+              </a:solidFill>
+            </a:endParaRPr>
+          </a:p>
+          <a:p>
+            <a:r>
+              <a:rPr lang="en-US" sz="2400" b="1" dirty="0">
+                <a:solidFill>
+                  <a:schemeClr val="bg1"/>
+                </a:solidFill>
+              </a:rPr>
+              <a:t>	- </a:t>
+            </a:r>
+            <a:r>
+              <a:rPr lang="en-US" sz="2400" b="1" dirty="0" err="1">
+                <a:solidFill>
+                  <a:schemeClr val="bg1"/>
+                </a:solidFill>
+              </a:rPr>
+              <a:t>kubectl</a:t>
+            </a:r>
+            <a:r>
+              <a:rPr lang="en-US" sz="2400" b="1" dirty="0">
+                <a:solidFill>
+                  <a:schemeClr val="bg1"/>
+                </a:solidFill>
+              </a:rPr>
+              <a:t> exec &lt;pod name&gt; -it /bin/</a:t>
+            </a:r>
+            <a:r>
+              <a:rPr lang="en-US" sz="2400" b="1" dirty="0" err="1">
+                <a:solidFill>
+                  <a:schemeClr val="bg1"/>
+                </a:solidFill>
+              </a:rPr>
+              <a:t>sh</a:t>
+            </a:r>
+            <a:endParaRPr lang="en-US" sz="2400" b="1" dirty="0">
+              <a:solidFill>
+                <a:schemeClr val="bg1"/>
+              </a:solidFill>
+            </a:endParaRPr>
+          </a:p>
+          <a:p>
+            <a:r>
+              <a:rPr lang="en-US" sz="2400" b="1" dirty="0">
+                <a:solidFill>
+                  <a:schemeClr val="bg1"/>
+                </a:solidFill>
+              </a:rPr>
+              <a:t>	- </a:t>
+            </a:r>
+            <a:r>
+              <a:rPr lang="en-US" sz="2400" b="1" dirty="0" err="1">
+                <a:solidFill>
+                  <a:schemeClr val="bg1"/>
+                </a:solidFill>
+              </a:rPr>
+              <a:t>printenv</a:t>
+            </a:r>
+            <a:endParaRPr lang="en-US" sz="2400" b="1" dirty="0">
+              <a:solidFill>
+                <a:schemeClr val="bg1"/>
+              </a:solidFill>
+            </a:endParaRPr>
+          </a:p>
+          <a:p>
+            <a:r>
+              <a:rPr lang="en-US" sz="2400" b="1" dirty="0">
+                <a:solidFill>
+                  <a:schemeClr val="bg1"/>
+                </a:solidFill>
+              </a:rPr>
+              <a:t>	- verify that SECRET_USERNAME AND SECRET_PASSWORD are both available as env. variables.</a:t>
+            </a:r>
+            <a:endParaRPr lang="en-IN" sz="2400" b="1" dirty="0">
+              <a:solidFill>
+                <a:schemeClr val="bg1"/>
+              </a:solidFill>
+            </a:endParaRPr>
+          </a:p>
+        </p:txBody>
+      </p:sp>
+    </p:spTree>
+    <p:extLst>
+      <p:ext uri="{BB962C8B-B14F-4D97-AF65-F5344CB8AC3E}">
+        <p14:creationId xmlns:p14="http://schemas.microsoft.com/office/powerpoint/2010/main" val="2668158416"/>
+      </p:ext>
+    </p:extLst>
+  </p:cSld>
+  <p:clrMapOvr>
+    <a:masterClrMapping/>
+  </p:clrMapOvr>
+</p:sld>
+</file>
+
+<file path=ppt/slides/slide73.xml><?xml version="1.0" encoding="utf-8"?>
+<p:sld xmlns:a="http://schemas.openxmlformats.org/drawingml/2006/main" xmlns:r="http://schemas.openxmlformats.org/officeDocument/2006/relationships" xmlns:p="http://schemas.openxmlformats.org/presentationml/2006/main">
+  <p:cSld>
+    <p:bg>
+      <p:bgPr>
+        <a:solidFill>
+          <a:schemeClr val="tx2">
+            <a:lumMod val="60000"/>
+            <a:lumOff val="40000"/>
+          </a:schemeClr>
+        </a:solidFill>
+        <a:effectLst/>
+      </p:bgPr>
+    </p:bg>
+    <p:spTree>
+      <p:nvGrpSpPr>
+        <p:cNvPr id="1" name=""/>
+        <p:cNvGrpSpPr/>
+        <p:nvPr/>
+      </p:nvGrpSpPr>
+      <p:grpSpPr>
+        <a:xfrm>
+          <a:off x="0" y="0"/>
+          <a:ext cx="0" cy="0"/>
+          <a:chOff x="0" y="0"/>
+          <a:chExt cx="0" cy="0"/>
+        </a:xfrm>
+      </p:grpSpPr>
+      <p:sp>
+        <p:nvSpPr>
+          <p:cNvPr id="2" name="Title 1">
+            <a:extLst>
+              <a:ext uri="{FF2B5EF4-FFF2-40B4-BE49-F238E27FC236}">
+                <a16:creationId xmlns:a16="http://schemas.microsoft.com/office/drawing/2014/main" id="{C5D36DB0-7732-4EB3-9925-FA6BC1656477}"/>
+              </a:ext>
+            </a:extLst>
+          </p:cNvPr>
+          <p:cNvSpPr>
+            <a:spLocks noGrp="1"/>
+          </p:cNvSpPr>
+          <p:nvPr>
+            <p:ph type="title"/>
+          </p:nvPr>
+        </p:nvSpPr>
+        <p:spPr/>
+        <p:txBody>
+          <a:bodyPr/>
+          <a:lstStyle/>
+          <a:p>
+            <a:r>
+              <a:rPr lang="en-US" b="1" dirty="0">
+                <a:solidFill>
+                  <a:schemeClr val="bg1"/>
+                </a:solidFill>
+              </a:rPr>
+              <a:t>Kubernetes Networking</a:t>
+            </a:r>
+            <a:endParaRPr lang="en-IN" b="1" dirty="0">
+              <a:solidFill>
+                <a:schemeClr val="bg1"/>
+              </a:solidFill>
+              <a:latin typeface="+mn-lt"/>
+              <a:ea typeface="+mn-ea"/>
+              <a:cs typeface="+mn-cs"/>
+            </a:endParaRPr>
+          </a:p>
+        </p:txBody>
+      </p:sp>
+      <p:sp>
+        <p:nvSpPr>
+          <p:cNvPr id="6" name="Rectangle 5">
+            <a:extLst>
+              <a:ext uri="{FF2B5EF4-FFF2-40B4-BE49-F238E27FC236}">
+                <a16:creationId xmlns:a16="http://schemas.microsoft.com/office/drawing/2014/main" id="{1AFE4F34-8260-4EB6-8248-06315F2B803F}"/>
+              </a:ext>
+            </a:extLst>
+          </p:cNvPr>
+          <p:cNvSpPr/>
+          <p:nvPr/>
+        </p:nvSpPr>
+        <p:spPr>
+          <a:xfrm>
+            <a:off x="939453" y="1903956"/>
+            <a:ext cx="11273420" cy="3895595"/>
+          </a:xfrm>
+          <a:prstGeom prst="rect">
+            <a:avLst/>
+          </a:prstGeom>
+        </p:spPr>
+        <p:txBody>
+          <a:bodyPr wrap="square">
+            <a:noAutofit/>
+          </a:bodyPr>
+          <a:lstStyle/>
+          <a:p>
+            <a:pPr marL="457200" indent="-457200">
+              <a:buFontTx/>
+              <a:buChar char="-"/>
+            </a:pPr>
+            <a:endParaRPr lang="en-US" sz="2600" b="1" dirty="0">
+              <a:solidFill>
+                <a:schemeClr val="bg1"/>
+              </a:solidFill>
+            </a:endParaRPr>
+          </a:p>
+          <a:p>
+            <a:pPr marL="457200" indent="-457200">
+              <a:buFontTx/>
+              <a:buChar char="-"/>
+            </a:pPr>
+            <a:endParaRPr lang="en-US" sz="2600" b="1" dirty="0">
+              <a:solidFill>
+                <a:schemeClr val="bg1"/>
+              </a:solidFill>
+            </a:endParaRPr>
+          </a:p>
+          <a:p>
+            <a:pPr marL="457200" indent="-457200">
+              <a:buFontTx/>
+              <a:buChar char="-"/>
+            </a:pPr>
+            <a:endParaRPr lang="en-US" sz="2600" b="1" dirty="0">
+              <a:solidFill>
+                <a:schemeClr val="bg1"/>
+              </a:solidFill>
+            </a:endParaRPr>
+          </a:p>
+        </p:txBody>
+      </p:sp>
+      <p:sp>
+        <p:nvSpPr>
+          <p:cNvPr id="3" name="Rectangle 2"/>
+          <p:cNvSpPr/>
+          <p:nvPr/>
+        </p:nvSpPr>
+        <p:spPr>
+          <a:xfrm>
+            <a:off x="965203" y="2065867"/>
+            <a:ext cx="10058399" cy="2846933"/>
+          </a:xfrm>
+          <a:prstGeom prst="rect">
+            <a:avLst/>
+          </a:prstGeom>
+          <a:solidFill>
+            <a:schemeClr val="accent3">
+              <a:lumMod val="75000"/>
+            </a:schemeClr>
+          </a:solidFill>
+        </p:spPr>
+        <p:txBody>
+          <a:bodyPr wrap="square">
+            <a:spAutoFit/>
+          </a:bodyPr>
+          <a:lstStyle/>
+          <a:p>
+            <a:r>
+              <a:rPr lang="en-US" sz="2500" b="1" dirty="0">
+                <a:solidFill>
+                  <a:schemeClr val="bg1"/>
+                </a:solidFill>
+              </a:rPr>
+              <a:t>Container to Container</a:t>
+            </a:r>
+          </a:p>
+          <a:p>
+            <a:r>
+              <a:rPr lang="en-US" b="1" dirty="0">
+                <a:solidFill>
+                  <a:schemeClr val="bg1"/>
+                </a:solidFill>
+              </a:rPr>
+              <a:t>				</a:t>
+            </a:r>
+          </a:p>
+          <a:p>
+            <a:r>
+              <a:rPr lang="en-US" b="1" dirty="0">
+                <a:solidFill>
+                  <a:schemeClr val="bg1"/>
+                </a:solidFill>
+              </a:rPr>
+              <a:t>						</a:t>
+            </a:r>
+            <a:r>
+              <a:rPr lang="en-US" sz="2500" b="1" dirty="0">
+                <a:solidFill>
+                  <a:schemeClr val="bg1"/>
+                </a:solidFill>
+              </a:rPr>
+              <a:t>Pod to Pod</a:t>
+            </a:r>
+          </a:p>
+          <a:p>
+            <a:endParaRPr lang="en-US" b="1" dirty="0">
+              <a:solidFill>
+                <a:schemeClr val="bg1"/>
+              </a:solidFill>
+            </a:endParaRPr>
+          </a:p>
+          <a:p>
+            <a:endParaRPr lang="en-US" b="1" dirty="0">
+              <a:solidFill>
+                <a:schemeClr val="bg1"/>
+              </a:solidFill>
+            </a:endParaRPr>
+          </a:p>
+          <a:p>
+            <a:endParaRPr lang="en-US" sz="2500" b="1" dirty="0">
+              <a:solidFill>
+                <a:schemeClr val="bg1"/>
+              </a:solidFill>
+            </a:endParaRPr>
+          </a:p>
+          <a:p>
+            <a:r>
+              <a:rPr lang="en-US" sz="2500" b="1" dirty="0">
+                <a:solidFill>
+                  <a:schemeClr val="bg1"/>
+                </a:solidFill>
+              </a:rPr>
+              <a:t>Pod to Service</a:t>
+            </a:r>
+          </a:p>
+          <a:p>
+            <a:r>
+              <a:rPr lang="en-US" b="1" dirty="0">
+                <a:solidFill>
+                  <a:schemeClr val="bg1"/>
+                </a:solidFill>
+              </a:rPr>
+              <a:t>						</a:t>
+            </a:r>
+            <a:r>
+              <a:rPr lang="en-US" sz="2500" b="1" dirty="0">
+                <a:solidFill>
+                  <a:schemeClr val="bg1"/>
+                </a:solidFill>
+              </a:rPr>
+              <a:t>External to Service</a:t>
+            </a:r>
+            <a:endParaRPr lang="en-US" b="1" dirty="0">
+              <a:solidFill>
+                <a:schemeClr val="bg1"/>
+              </a:solidFill>
+            </a:endParaRPr>
+          </a:p>
+        </p:txBody>
+      </p:sp>
+    </p:spTree>
+    <p:extLst>
+      <p:ext uri="{BB962C8B-B14F-4D97-AF65-F5344CB8AC3E}">
+        <p14:creationId xmlns:p14="http://schemas.microsoft.com/office/powerpoint/2010/main" val="1376410410"/>
+      </p:ext>
+    </p:extLst>
+  </p:cSld>
+  <p:clrMapOvr>
+    <a:masterClrMapping/>
+  </p:clrMapOvr>
+</p:sld>
+</file>
+
+<file path=ppt/slides/slide74.xml><?xml version="1.0" encoding="utf-8"?>
+<p:sld xmlns:a="http://schemas.openxmlformats.org/drawingml/2006/main" xmlns:r="http://schemas.openxmlformats.org/officeDocument/2006/relationships" xmlns:p="http://schemas.openxmlformats.org/presentationml/2006/main">
+  <p:cSld>
+    <p:bg>
+      <p:bgPr>
+        <a:solidFill>
+          <a:schemeClr val="tx2">
+            <a:lumMod val="60000"/>
+            <a:lumOff val="40000"/>
+          </a:schemeClr>
+        </a:solidFill>
+        <a:effectLst/>
+      </p:bgPr>
+    </p:bg>
+    <p:spTree>
+      <p:nvGrpSpPr>
+        <p:cNvPr id="1" name=""/>
+        <p:cNvGrpSpPr/>
+        <p:nvPr/>
+      </p:nvGrpSpPr>
+      <p:grpSpPr>
+        <a:xfrm>
+          <a:off x="0" y="0"/>
+          <a:ext cx="0" cy="0"/>
+          <a:chOff x="0" y="0"/>
+          <a:chExt cx="0" cy="0"/>
+        </a:xfrm>
+      </p:grpSpPr>
+      <p:sp>
+        <p:nvSpPr>
+          <p:cNvPr id="2" name="Title 1">
+            <a:extLst>
+              <a:ext uri="{FF2B5EF4-FFF2-40B4-BE49-F238E27FC236}">
+                <a16:creationId xmlns:a16="http://schemas.microsoft.com/office/drawing/2014/main" id="{C5D36DB0-7732-4EB3-9925-FA6BC1656477}"/>
+              </a:ext>
+            </a:extLst>
+          </p:cNvPr>
+          <p:cNvSpPr>
+            <a:spLocks noGrp="1"/>
+          </p:cNvSpPr>
+          <p:nvPr>
+            <p:ph type="title"/>
+          </p:nvPr>
+        </p:nvSpPr>
+        <p:spPr/>
+        <p:txBody>
+          <a:bodyPr/>
+          <a:lstStyle/>
+          <a:p>
+            <a:r>
+              <a:rPr lang="en-US" b="1" dirty="0">
+                <a:solidFill>
+                  <a:schemeClr val="bg1"/>
+                </a:solidFill>
+              </a:rPr>
+              <a:t>Container to Container Communication</a:t>
+            </a:r>
+            <a:endParaRPr lang="en-IN" b="1" dirty="0">
+              <a:solidFill>
+                <a:schemeClr val="bg1"/>
+              </a:solidFill>
+              <a:latin typeface="+mn-lt"/>
+              <a:ea typeface="+mn-ea"/>
+              <a:cs typeface="+mn-cs"/>
+            </a:endParaRPr>
+          </a:p>
+        </p:txBody>
+      </p:sp>
+      <p:sp>
+        <p:nvSpPr>
+          <p:cNvPr id="6" name="Rectangle 5">
+            <a:extLst>
+              <a:ext uri="{FF2B5EF4-FFF2-40B4-BE49-F238E27FC236}">
+                <a16:creationId xmlns:a16="http://schemas.microsoft.com/office/drawing/2014/main" id="{1AFE4F34-8260-4EB6-8248-06315F2B803F}"/>
+              </a:ext>
+            </a:extLst>
+          </p:cNvPr>
+          <p:cNvSpPr/>
+          <p:nvPr/>
+        </p:nvSpPr>
+        <p:spPr>
+          <a:xfrm>
+            <a:off x="939453" y="1903956"/>
+            <a:ext cx="11273420" cy="3895595"/>
+          </a:xfrm>
+          <a:prstGeom prst="rect">
+            <a:avLst/>
+          </a:prstGeom>
+        </p:spPr>
+        <p:txBody>
+          <a:bodyPr wrap="square">
+            <a:noAutofit/>
+          </a:bodyPr>
+          <a:lstStyle/>
+          <a:p>
+            <a:pPr marL="457200" indent="-457200">
+              <a:buFontTx/>
+              <a:buChar char="-"/>
+            </a:pPr>
+            <a:endParaRPr lang="en-US" sz="2600" b="1" dirty="0">
+              <a:solidFill>
+                <a:schemeClr val="bg1"/>
+              </a:solidFill>
+            </a:endParaRPr>
+          </a:p>
+          <a:p>
+            <a:pPr marL="457200" indent="-457200">
+              <a:buFontTx/>
+              <a:buChar char="-"/>
+            </a:pPr>
+            <a:endParaRPr lang="en-US" sz="2600" b="1" dirty="0">
+              <a:solidFill>
+                <a:schemeClr val="bg1"/>
+              </a:solidFill>
+            </a:endParaRPr>
+          </a:p>
+          <a:p>
+            <a:pPr marL="457200" indent="-457200">
+              <a:buFontTx/>
+              <a:buChar char="-"/>
+            </a:pPr>
+            <a:endParaRPr lang="en-US" sz="2600" b="1" dirty="0">
+              <a:solidFill>
+                <a:schemeClr val="bg1"/>
+              </a:solidFill>
+            </a:endParaRPr>
+          </a:p>
+        </p:txBody>
+      </p:sp>
+      <p:sp>
+        <p:nvSpPr>
+          <p:cNvPr id="3" name="Rectangle 2"/>
+          <p:cNvSpPr/>
+          <p:nvPr/>
+        </p:nvSpPr>
+        <p:spPr>
+          <a:xfrm>
+            <a:off x="965203" y="2065867"/>
+            <a:ext cx="10058399" cy="1200329"/>
+          </a:xfrm>
+          <a:prstGeom prst="rect">
+            <a:avLst/>
+          </a:prstGeom>
+        </p:spPr>
+        <p:txBody>
+          <a:bodyPr wrap="square">
+            <a:spAutoFit/>
+          </a:bodyPr>
+          <a:lstStyle/>
+          <a:p>
+            <a:r>
+              <a:rPr lang="en-US" b="1" dirty="0">
+                <a:solidFill>
+                  <a:schemeClr val="bg1"/>
+                </a:solidFill>
+              </a:rPr>
+              <a:t>- Share the same network space   </a:t>
+            </a:r>
+          </a:p>
+          <a:p>
+            <a:r>
+              <a:rPr lang="en-US" b="1" dirty="0">
+                <a:solidFill>
+                  <a:schemeClr val="bg1"/>
+                </a:solidFill>
+              </a:rPr>
+              <a:t>- Highly coupled Pod</a:t>
+            </a:r>
+          </a:p>
+          <a:p>
+            <a:r>
+              <a:rPr lang="en-IN" b="1" dirty="0">
+                <a:solidFill>
+                  <a:schemeClr val="bg1"/>
+                </a:solidFill>
+              </a:rPr>
+              <a:t>- Localhost</a:t>
+            </a:r>
+          </a:p>
+          <a:p>
+            <a:pPr marL="285750" indent="-285750">
+              <a:buFontTx/>
+              <a:buChar char="-"/>
+            </a:pPr>
+            <a:endParaRPr lang="en-IN" b="1" dirty="0">
+              <a:solidFill>
+                <a:schemeClr val="bg1"/>
+              </a:solidFill>
+            </a:endParaRPr>
+          </a:p>
+        </p:txBody>
+      </p:sp>
+    </p:spTree>
+    <p:extLst>
+      <p:ext uri="{BB962C8B-B14F-4D97-AF65-F5344CB8AC3E}">
+        <p14:creationId xmlns:p14="http://schemas.microsoft.com/office/powerpoint/2010/main" val="583697653"/>
+      </p:ext>
+    </p:extLst>
+  </p:cSld>
+  <p:clrMapOvr>
+    <a:masterClrMapping/>
+  </p:clrMapOvr>
+</p:sld>
+</file>
+
+<file path=ppt/slides/slide75.xml><?xml version="1.0" encoding="utf-8"?>
+<p:sld xmlns:a="http://schemas.openxmlformats.org/drawingml/2006/main" xmlns:r="http://schemas.openxmlformats.org/officeDocument/2006/relationships" xmlns:p="http://schemas.openxmlformats.org/presentationml/2006/main">
+  <p:cSld>
+    <p:bg>
+      <p:bgPr>
+        <a:solidFill>
+          <a:schemeClr val="tx2">
+            <a:lumMod val="60000"/>
+            <a:lumOff val="40000"/>
+          </a:schemeClr>
+        </a:solidFill>
+        <a:effectLst/>
+      </p:bgPr>
+    </p:bg>
+    <p:spTree>
+      <p:nvGrpSpPr>
+        <p:cNvPr id="1" name=""/>
+        <p:cNvGrpSpPr/>
+        <p:nvPr/>
+      </p:nvGrpSpPr>
+      <p:grpSpPr>
+        <a:xfrm>
+          <a:off x="0" y="0"/>
+          <a:ext cx="0" cy="0"/>
+          <a:chOff x="0" y="0"/>
+          <a:chExt cx="0" cy="0"/>
+        </a:xfrm>
+      </p:grpSpPr>
+      <p:sp>
+        <p:nvSpPr>
+          <p:cNvPr id="2" name="Title 1">
+            <a:extLst>
+              <a:ext uri="{FF2B5EF4-FFF2-40B4-BE49-F238E27FC236}">
+                <a16:creationId xmlns:a16="http://schemas.microsoft.com/office/drawing/2014/main" id="{C5D36DB0-7732-4EB3-9925-FA6BC1656477}"/>
+              </a:ext>
+            </a:extLst>
+          </p:cNvPr>
+          <p:cNvSpPr>
+            <a:spLocks noGrp="1"/>
+          </p:cNvSpPr>
+          <p:nvPr>
+            <p:ph type="title"/>
+          </p:nvPr>
+        </p:nvSpPr>
+        <p:spPr/>
+        <p:txBody>
+          <a:bodyPr/>
+          <a:lstStyle/>
+          <a:p>
+            <a:r>
+              <a:rPr lang="en-US" b="1" dirty="0">
+                <a:solidFill>
+                  <a:schemeClr val="bg1"/>
+                </a:solidFill>
+              </a:rPr>
+              <a:t>Pod to Pod Communication</a:t>
+            </a:r>
+            <a:endParaRPr lang="en-IN" b="1" dirty="0">
+              <a:solidFill>
+                <a:schemeClr val="bg1"/>
+              </a:solidFill>
+              <a:latin typeface="+mn-lt"/>
+              <a:ea typeface="+mn-ea"/>
+              <a:cs typeface="+mn-cs"/>
+            </a:endParaRPr>
+          </a:p>
+        </p:txBody>
+      </p:sp>
+      <p:sp>
+        <p:nvSpPr>
+          <p:cNvPr id="6" name="Rectangle 5">
+            <a:extLst>
+              <a:ext uri="{FF2B5EF4-FFF2-40B4-BE49-F238E27FC236}">
+                <a16:creationId xmlns:a16="http://schemas.microsoft.com/office/drawing/2014/main" id="{1AFE4F34-8260-4EB6-8248-06315F2B803F}"/>
+              </a:ext>
+            </a:extLst>
+          </p:cNvPr>
+          <p:cNvSpPr/>
+          <p:nvPr/>
+        </p:nvSpPr>
+        <p:spPr>
+          <a:xfrm>
+            <a:off x="939453" y="1903956"/>
+            <a:ext cx="11273420" cy="3895595"/>
+          </a:xfrm>
+          <a:prstGeom prst="rect">
+            <a:avLst/>
+          </a:prstGeom>
+        </p:spPr>
+        <p:txBody>
+          <a:bodyPr wrap="square">
+            <a:noAutofit/>
+          </a:bodyPr>
+          <a:lstStyle/>
+          <a:p>
+            <a:pPr marL="457200" indent="-457200">
+              <a:buFontTx/>
+              <a:buChar char="-"/>
+            </a:pPr>
+            <a:endParaRPr lang="en-US" sz="2600" b="1" dirty="0">
+              <a:solidFill>
+                <a:schemeClr val="bg1"/>
+              </a:solidFill>
+            </a:endParaRPr>
+          </a:p>
+          <a:p>
+            <a:pPr marL="457200" indent="-457200">
+              <a:buFontTx/>
+              <a:buChar char="-"/>
+            </a:pPr>
+            <a:endParaRPr lang="en-US" sz="2600" b="1" dirty="0">
+              <a:solidFill>
+                <a:schemeClr val="bg1"/>
+              </a:solidFill>
+            </a:endParaRPr>
+          </a:p>
+          <a:p>
+            <a:pPr marL="457200" indent="-457200">
+              <a:buFontTx/>
+              <a:buChar char="-"/>
+            </a:pPr>
+            <a:endParaRPr lang="en-US" sz="2600" b="1" dirty="0">
+              <a:solidFill>
+                <a:schemeClr val="bg1"/>
+              </a:solidFill>
+            </a:endParaRPr>
+          </a:p>
+        </p:txBody>
+      </p:sp>
+      <p:sp>
+        <p:nvSpPr>
+          <p:cNvPr id="3" name="Rectangle 2"/>
+          <p:cNvSpPr/>
+          <p:nvPr/>
+        </p:nvSpPr>
+        <p:spPr>
+          <a:xfrm>
+            <a:off x="939453" y="2038159"/>
+            <a:ext cx="10058399" cy="3416320"/>
+          </a:xfrm>
+          <a:prstGeom prst="rect">
+            <a:avLst/>
+          </a:prstGeom>
+        </p:spPr>
+        <p:txBody>
+          <a:bodyPr wrap="square">
+            <a:spAutoFit/>
+          </a:bodyPr>
+          <a:lstStyle/>
+          <a:p>
+            <a:pPr marL="285750" indent="-285750">
+              <a:buFontTx/>
+              <a:buChar char="-"/>
+            </a:pPr>
+            <a:r>
+              <a:rPr lang="en-US" b="1" dirty="0">
+                <a:solidFill>
+                  <a:schemeClr val="bg1"/>
+                </a:solidFill>
+              </a:rPr>
+              <a:t>Pod’s have IP address</a:t>
+            </a:r>
+          </a:p>
+          <a:p>
+            <a:pPr marL="285750" indent="-285750">
+              <a:buFontTx/>
+              <a:buChar char="-"/>
+            </a:pPr>
+            <a:r>
+              <a:rPr lang="en-US" b="1" dirty="0">
+                <a:solidFill>
+                  <a:schemeClr val="bg1"/>
+                </a:solidFill>
+              </a:rPr>
+              <a:t>Containers with in Pod share the network namespace including IP.</a:t>
+            </a:r>
+          </a:p>
+          <a:p>
+            <a:pPr marL="285750" indent="-285750">
+              <a:buFontTx/>
+              <a:buChar char="-"/>
+            </a:pPr>
+            <a:r>
+              <a:rPr lang="en-US" b="1" dirty="0">
+                <a:solidFill>
+                  <a:schemeClr val="bg1"/>
+                </a:solidFill>
+              </a:rPr>
+              <a:t>Implemented by Network drivers</a:t>
+            </a:r>
+          </a:p>
+          <a:p>
+            <a:pPr marL="285750" indent="-285750">
+              <a:buFontTx/>
+              <a:buChar char="-"/>
+            </a:pPr>
+            <a:r>
+              <a:rPr lang="en-US" b="1" dirty="0">
+                <a:solidFill>
+                  <a:schemeClr val="bg1"/>
+                </a:solidFill>
+              </a:rPr>
+              <a:t>Rules</a:t>
+            </a:r>
+          </a:p>
+          <a:p>
+            <a:pPr marL="742950" lvl="1" indent="-285750">
+              <a:buFontTx/>
+              <a:buChar char="-"/>
+            </a:pPr>
+            <a:r>
+              <a:rPr lang="en-US" dirty="0"/>
+              <a:t>pods can communicate with all pods without NAT</a:t>
+            </a:r>
+            <a:endParaRPr lang="en-IN" b="1" dirty="0">
+              <a:solidFill>
+                <a:schemeClr val="bg1"/>
+              </a:solidFill>
+            </a:endParaRPr>
+          </a:p>
+          <a:p>
+            <a:pPr marL="742950" lvl="1" indent="-285750">
+              <a:buFontTx/>
+              <a:buChar char="-"/>
+            </a:pPr>
+            <a:r>
+              <a:rPr lang="en-US" dirty="0"/>
+              <a:t>agents on a node (e.g. system daemons, </a:t>
+            </a:r>
+            <a:r>
+              <a:rPr lang="en-US" dirty="0" err="1"/>
+              <a:t>kubelet</a:t>
+            </a:r>
+            <a:r>
+              <a:rPr lang="en-US" dirty="0"/>
+              <a:t>) can communicate with all pods</a:t>
+            </a:r>
+          </a:p>
+          <a:p>
+            <a:pPr marL="742950" lvl="1" indent="-285750">
+              <a:buFontTx/>
+              <a:buChar char="-"/>
+            </a:pPr>
+            <a:r>
+              <a:rPr lang="en-US" dirty="0"/>
+              <a:t>For platforms that support Pod running in host network (</a:t>
+            </a:r>
+            <a:r>
+              <a:rPr lang="en-US" dirty="0" err="1"/>
+              <a:t>linux</a:t>
+            </a:r>
+            <a:r>
+              <a:rPr lang="en-US" dirty="0"/>
+              <a:t>)</a:t>
+            </a:r>
+          </a:p>
+          <a:p>
+            <a:pPr marL="1200150" lvl="2" indent="-285750">
+              <a:buFontTx/>
+              <a:buChar char="-"/>
+            </a:pPr>
+            <a:r>
+              <a:rPr lang="en-US" dirty="0"/>
+              <a:t>pods in host network of node can communicate with all pods without NAT</a:t>
+            </a:r>
+            <a:endParaRPr lang="en-IN" b="1" dirty="0">
+              <a:solidFill>
+                <a:schemeClr val="bg1"/>
+              </a:solidFill>
+            </a:endParaRPr>
+          </a:p>
+          <a:p>
+            <a:pPr marL="285750" indent="-285750">
+              <a:buFontTx/>
+              <a:buChar char="-"/>
+            </a:pPr>
+            <a:r>
+              <a:rPr lang="en-IN" b="1" dirty="0">
+                <a:solidFill>
+                  <a:schemeClr val="bg1"/>
+                </a:solidFill>
+              </a:rPr>
+              <a:t>Simple and less friction model</a:t>
+            </a:r>
+          </a:p>
+          <a:p>
+            <a:pPr marL="285750" indent="-285750">
+              <a:buFontTx/>
+              <a:buChar char="-"/>
+            </a:pPr>
+            <a:r>
+              <a:rPr lang="en-IN" b="1" dirty="0">
+                <a:solidFill>
+                  <a:schemeClr val="bg1"/>
+                </a:solidFill>
+              </a:rPr>
+              <a:t>Containers should co-ordinate Port like how it happens on VM’s. IP-per-Pod model.</a:t>
+            </a:r>
+          </a:p>
+          <a:p>
+            <a:pPr marL="285750" indent="-285750">
+              <a:buFontTx/>
+              <a:buChar char="-"/>
+            </a:pPr>
+            <a:endParaRPr lang="en-IN" b="1" dirty="0">
+              <a:solidFill>
+                <a:schemeClr val="bg1"/>
+              </a:solidFill>
+            </a:endParaRPr>
+          </a:p>
+          <a:p>
+            <a:pPr marL="285750" indent="-285750">
+              <a:buFontTx/>
+              <a:buChar char="-"/>
+            </a:pPr>
+            <a:endParaRPr lang="en-IN" b="1" dirty="0">
+              <a:solidFill>
+                <a:schemeClr val="bg1"/>
+              </a:solidFill>
+            </a:endParaRPr>
+          </a:p>
+        </p:txBody>
+      </p:sp>
+    </p:spTree>
+    <p:extLst>
+      <p:ext uri="{BB962C8B-B14F-4D97-AF65-F5344CB8AC3E}">
+        <p14:creationId xmlns:p14="http://schemas.microsoft.com/office/powerpoint/2010/main" val="1915203204"/>
+      </p:ext>
+    </p:extLst>
+  </p:cSld>
+  <p:clrMapOvr>
+    <a:masterClrMapping/>
+  </p:clrMapOvr>
+</p:sld>
+</file>
+
+<file path=ppt/slides/slide76.xml><?xml version="1.0" encoding="utf-8"?>
+<p:sld xmlns:a="http://schemas.openxmlformats.org/drawingml/2006/main" xmlns:r="http://schemas.openxmlformats.org/officeDocument/2006/relationships" xmlns:p="http://schemas.openxmlformats.org/presentationml/2006/main">
+  <p:cSld>
+    <p:bg>
+      <p:bgPr>
+        <a:solidFill>
+          <a:schemeClr val="tx2">
+            <a:lumMod val="60000"/>
+            <a:lumOff val="40000"/>
+          </a:schemeClr>
+        </a:solidFill>
+        <a:effectLst/>
+      </p:bgPr>
+    </p:bg>
+    <p:spTree>
+      <p:nvGrpSpPr>
+        <p:cNvPr id="1" name=""/>
+        <p:cNvGrpSpPr/>
+        <p:nvPr/>
+      </p:nvGrpSpPr>
+      <p:grpSpPr>
+        <a:xfrm>
+          <a:off x="0" y="0"/>
+          <a:ext cx="0" cy="0"/>
+          <a:chOff x="0" y="0"/>
+          <a:chExt cx="0" cy="0"/>
+        </a:xfrm>
+      </p:grpSpPr>
+      <p:sp>
+        <p:nvSpPr>
+          <p:cNvPr id="2" name="Title 1">
+            <a:extLst>
+              <a:ext uri="{FF2B5EF4-FFF2-40B4-BE49-F238E27FC236}">
+                <a16:creationId xmlns:a16="http://schemas.microsoft.com/office/drawing/2014/main" id="{C5D36DB0-7732-4EB3-9925-FA6BC1656477}"/>
+              </a:ext>
+            </a:extLst>
+          </p:cNvPr>
+          <p:cNvSpPr>
+            <a:spLocks noGrp="1"/>
+          </p:cNvSpPr>
+          <p:nvPr>
+            <p:ph type="title"/>
+          </p:nvPr>
+        </p:nvSpPr>
+        <p:spPr/>
+        <p:txBody>
+          <a:bodyPr/>
+          <a:lstStyle/>
+          <a:p>
+            <a:r>
+              <a:rPr lang="en-US" b="1" dirty="0">
+                <a:solidFill>
+                  <a:schemeClr val="bg1"/>
+                </a:solidFill>
+              </a:rPr>
               <a:t>Pod to Pod Communication</a:t>
             </a:r>
             <a:endParaRPr lang="en-IN" b="1" dirty="0">
@@ -21727,7 +23605,7 @@
 </p:sld>
 </file>
 
-<file path=ppt/slides/slide71.xml><?xml version="1.0" encoding="utf-8"?>
+<file path=ppt/slides/slide77.xml><?xml version="1.0" encoding="utf-8"?>
 <p:sld xmlns:a="http://schemas.openxmlformats.org/drawingml/2006/main" xmlns:r="http://schemas.openxmlformats.org/officeDocument/2006/relationships" xmlns:p="http://schemas.openxmlformats.org/presentationml/2006/main">
   <p:cSld>
     <p:bg>
@@ -21937,7 +23815,7 @@
 </p:sld>
 </file>
 
-<file path=ppt/slides/slide72.xml><?xml version="1.0" encoding="utf-8"?>
+<file path=ppt/slides/slide78.xml><?xml version="1.0" encoding="utf-8"?>
 <p:sld xmlns:a="http://schemas.openxmlformats.org/drawingml/2006/main" xmlns:r="http://schemas.openxmlformats.org/officeDocument/2006/relationships" xmlns:p="http://schemas.openxmlformats.org/presentationml/2006/main">
   <p:cSld>
     <p:bg>
@@ -22147,7 +24025,7 @@
 </p:sld>
 </file>
 
-<file path=ppt/slides/slide73.xml><?xml version="1.0" encoding="utf-8"?>
+<file path=ppt/slides/slide79.xml><?xml version="1.0" encoding="utf-8"?>
 <p:sld xmlns:a="http://schemas.openxmlformats.org/drawingml/2006/main" xmlns:r="http://schemas.openxmlformats.org/officeDocument/2006/relationships" xmlns:p="http://schemas.openxmlformats.org/presentationml/2006/main">
   <p:cSld>
     <p:bg>
@@ -22357,178 +24235,6 @@
 </p:sld>
 </file>
 
-<file path=ppt/slides/slide74.xml><?xml version="1.0" encoding="utf-8"?>
-<p:sld xmlns:a="http://schemas.openxmlformats.org/drawingml/2006/main" xmlns:r="http://schemas.openxmlformats.org/officeDocument/2006/relationships" xmlns:p="http://schemas.openxmlformats.org/presentationml/2006/main">
-  <p:cSld>
-    <p:bg>
-      <p:bgPr>
-        <a:solidFill>
-          <a:schemeClr val="tx2">
-            <a:lumMod val="60000"/>
-            <a:lumOff val="40000"/>
-          </a:schemeClr>
-        </a:solidFill>
-        <a:effectLst/>
-      </p:bgPr>
-    </p:bg>
-    <p:spTree>
-      <p:nvGrpSpPr>
-        <p:cNvPr id="1" name=""/>
-        <p:cNvGrpSpPr/>
-        <p:nvPr/>
-      </p:nvGrpSpPr>
-      <p:grpSpPr>
-        <a:xfrm>
-          <a:off x="0" y="0"/>
-          <a:ext cx="0" cy="0"/>
-          <a:chOff x="0" y="0"/>
-          <a:chExt cx="0" cy="0"/>
-        </a:xfrm>
-      </p:grpSpPr>
-      <p:sp>
-        <p:nvSpPr>
-          <p:cNvPr id="2" name="Title 1">
-            <a:extLst>
-              <a:ext uri="{FF2B5EF4-FFF2-40B4-BE49-F238E27FC236}">
-                <a16:creationId xmlns:a16="http://schemas.microsoft.com/office/drawing/2014/main" id="{C5D36DB0-7732-4EB3-9925-FA6BC1656477}"/>
-              </a:ext>
-            </a:extLst>
-          </p:cNvPr>
-          <p:cNvSpPr>
-            <a:spLocks noGrp="1"/>
-          </p:cNvSpPr>
-          <p:nvPr>
-            <p:ph type="title"/>
-          </p:nvPr>
-        </p:nvSpPr>
-        <p:spPr/>
-        <p:txBody>
-          <a:bodyPr/>
-          <a:lstStyle/>
-          <a:p>
-            <a:r>
-              <a:rPr lang="en-US" b="1" dirty="0">
-                <a:solidFill>
-                  <a:schemeClr val="bg1"/>
-                </a:solidFill>
-              </a:rPr>
-              <a:t>CI/CD</a:t>
-            </a:r>
-            <a:endParaRPr lang="en-IN" b="1" dirty="0">
-              <a:solidFill>
-                <a:schemeClr val="bg1"/>
-              </a:solidFill>
-              <a:latin typeface="+mn-lt"/>
-              <a:ea typeface="+mn-ea"/>
-              <a:cs typeface="+mn-cs"/>
-            </a:endParaRPr>
-          </a:p>
-        </p:txBody>
-      </p:sp>
-      <p:sp>
-        <p:nvSpPr>
-          <p:cNvPr id="6" name="Rectangle 5">
-            <a:extLst>
-              <a:ext uri="{FF2B5EF4-FFF2-40B4-BE49-F238E27FC236}">
-                <a16:creationId xmlns:a16="http://schemas.microsoft.com/office/drawing/2014/main" id="{1AFE4F34-8260-4EB6-8248-06315F2B803F}"/>
-              </a:ext>
-            </a:extLst>
-          </p:cNvPr>
-          <p:cNvSpPr/>
-          <p:nvPr/>
-        </p:nvSpPr>
-        <p:spPr>
-          <a:xfrm>
-            <a:off x="939453" y="1903956"/>
-            <a:ext cx="11273420" cy="3895595"/>
-          </a:xfrm>
-          <a:prstGeom prst="rect">
-            <a:avLst/>
-          </a:prstGeom>
-        </p:spPr>
-        <p:txBody>
-          <a:bodyPr wrap="square">
-            <a:noAutofit/>
-          </a:bodyPr>
-          <a:lstStyle/>
-          <a:p>
-            <a:pPr marL="457200" indent="-457200">
-              <a:buFontTx/>
-              <a:buChar char="-"/>
-            </a:pPr>
-            <a:endParaRPr lang="en-US" sz="2600" b="1" dirty="0">
-              <a:solidFill>
-                <a:schemeClr val="bg1"/>
-              </a:solidFill>
-            </a:endParaRPr>
-          </a:p>
-          <a:p>
-            <a:pPr marL="457200" indent="-457200">
-              <a:buFontTx/>
-              <a:buChar char="-"/>
-            </a:pPr>
-            <a:endParaRPr lang="en-US" sz="2600" b="1" dirty="0">
-              <a:solidFill>
-                <a:schemeClr val="bg1"/>
-              </a:solidFill>
-            </a:endParaRPr>
-          </a:p>
-          <a:p>
-            <a:pPr marL="457200" indent="-457200">
-              <a:buFontTx/>
-              <a:buChar char="-"/>
-            </a:pPr>
-            <a:endParaRPr lang="en-US" sz="2600" b="1" dirty="0">
-              <a:solidFill>
-                <a:schemeClr val="bg1"/>
-              </a:solidFill>
-            </a:endParaRPr>
-          </a:p>
-        </p:txBody>
-      </p:sp>
-      <p:pic>
-        <p:nvPicPr>
-          <p:cNvPr id="5" name="Picture 4"/>
-          <p:cNvPicPr>
-            <a:picLocks noChangeAspect="1"/>
-          </p:cNvPicPr>
-          <p:nvPr/>
-        </p:nvPicPr>
-        <p:blipFill>
-          <a:blip r:embed="rId2">
-            <a:extLst>
-              <a:ext uri="{28A0092B-C50C-407E-A947-70E740481C1C}">
-                <a14:useLocalDpi xmlns:a14="http://schemas.microsoft.com/office/drawing/2010/main" val="0"/>
-              </a:ext>
-            </a:extLst>
-          </a:blip>
-          <a:stretch>
-            <a:fillRect/>
-          </a:stretch>
-        </p:blipFill>
-        <p:spPr>
-          <a:xfrm>
-            <a:off x="1662545" y="1479450"/>
-            <a:ext cx="8866910" cy="4875168"/>
-          </a:xfrm>
-          <a:prstGeom prst="rect">
-            <a:avLst/>
-          </a:prstGeom>
-        </p:spPr>
-      </p:pic>
-    </p:spTree>
-    <p:extLst>
-      <p:ext uri="{BB962C8B-B14F-4D97-AF65-F5344CB8AC3E}">
-        <p14:creationId xmlns:p14="http://schemas.microsoft.com/office/powerpoint/2010/main" val="3662928949"/>
-      </p:ext>
-    </p:extLst>
-  </p:cSld>
-  <p:clrMapOvr>
-    <a:masterClrMapping/>
-  </p:clrMapOvr>
-</p:sld>
-</file>
-
 <file path=ppt/slides/slide8.xml><?xml version="1.0" encoding="utf-8"?>
 <p:sld xmlns:a="http://schemas.openxmlformats.org/drawingml/2006/main" xmlns:r="http://schemas.openxmlformats.org/officeDocument/2006/relationships" xmlns:p="http://schemas.openxmlformats.org/presentationml/2006/main">
   <p:cSld>
@@ -22682,6 +24388,178 @@
     <p:extLst>
       <p:ext uri="{BB962C8B-B14F-4D97-AF65-F5344CB8AC3E}">
         <p14:creationId xmlns:p14="http://schemas.microsoft.com/office/powerpoint/2010/main" val="256110599"/>
+      </p:ext>
+    </p:extLst>
+  </p:cSld>
+  <p:clrMapOvr>
+    <a:masterClrMapping/>
+  </p:clrMapOvr>
+</p:sld>
+</file>
+
+<file path=ppt/slides/slide80.xml><?xml version="1.0" encoding="utf-8"?>
+<p:sld xmlns:a="http://schemas.openxmlformats.org/drawingml/2006/main" xmlns:r="http://schemas.openxmlformats.org/officeDocument/2006/relationships" xmlns:p="http://schemas.openxmlformats.org/presentationml/2006/main">
+  <p:cSld>
+    <p:bg>
+      <p:bgPr>
+        <a:solidFill>
+          <a:schemeClr val="tx2">
+            <a:lumMod val="60000"/>
+            <a:lumOff val="40000"/>
+          </a:schemeClr>
+        </a:solidFill>
+        <a:effectLst/>
+      </p:bgPr>
+    </p:bg>
+    <p:spTree>
+      <p:nvGrpSpPr>
+        <p:cNvPr id="1" name=""/>
+        <p:cNvGrpSpPr/>
+        <p:nvPr/>
+      </p:nvGrpSpPr>
+      <p:grpSpPr>
+        <a:xfrm>
+          <a:off x="0" y="0"/>
+          <a:ext cx="0" cy="0"/>
+          <a:chOff x="0" y="0"/>
+          <a:chExt cx="0" cy="0"/>
+        </a:xfrm>
+      </p:grpSpPr>
+      <p:sp>
+        <p:nvSpPr>
+          <p:cNvPr id="2" name="Title 1">
+            <a:extLst>
+              <a:ext uri="{FF2B5EF4-FFF2-40B4-BE49-F238E27FC236}">
+                <a16:creationId xmlns:a16="http://schemas.microsoft.com/office/drawing/2014/main" id="{C5D36DB0-7732-4EB3-9925-FA6BC1656477}"/>
+              </a:ext>
+            </a:extLst>
+          </p:cNvPr>
+          <p:cNvSpPr>
+            <a:spLocks noGrp="1"/>
+          </p:cNvSpPr>
+          <p:nvPr>
+            <p:ph type="title"/>
+          </p:nvPr>
+        </p:nvSpPr>
+        <p:spPr/>
+        <p:txBody>
+          <a:bodyPr/>
+          <a:lstStyle/>
+          <a:p>
+            <a:r>
+              <a:rPr lang="en-US" b="1" dirty="0">
+                <a:solidFill>
+                  <a:schemeClr val="bg1"/>
+                </a:solidFill>
+              </a:rPr>
+              <a:t>CI/CD</a:t>
+            </a:r>
+            <a:endParaRPr lang="en-IN" b="1" dirty="0">
+              <a:solidFill>
+                <a:schemeClr val="bg1"/>
+              </a:solidFill>
+              <a:latin typeface="+mn-lt"/>
+              <a:ea typeface="+mn-ea"/>
+              <a:cs typeface="+mn-cs"/>
+            </a:endParaRPr>
+          </a:p>
+        </p:txBody>
+      </p:sp>
+      <p:sp>
+        <p:nvSpPr>
+          <p:cNvPr id="6" name="Rectangle 5">
+            <a:extLst>
+              <a:ext uri="{FF2B5EF4-FFF2-40B4-BE49-F238E27FC236}">
+                <a16:creationId xmlns:a16="http://schemas.microsoft.com/office/drawing/2014/main" id="{1AFE4F34-8260-4EB6-8248-06315F2B803F}"/>
+              </a:ext>
+            </a:extLst>
+          </p:cNvPr>
+          <p:cNvSpPr/>
+          <p:nvPr/>
+        </p:nvSpPr>
+        <p:spPr>
+          <a:xfrm>
+            <a:off x="939453" y="1903956"/>
+            <a:ext cx="11273420" cy="3895595"/>
+          </a:xfrm>
+          <a:prstGeom prst="rect">
+            <a:avLst/>
+          </a:prstGeom>
+        </p:spPr>
+        <p:txBody>
+          <a:bodyPr wrap="square">
+            <a:noAutofit/>
+          </a:bodyPr>
+          <a:lstStyle/>
+          <a:p>
+            <a:pPr marL="457200" indent="-457200">
+              <a:buFontTx/>
+              <a:buChar char="-"/>
+            </a:pPr>
+            <a:endParaRPr lang="en-US" sz="2600" b="1" dirty="0">
+              <a:solidFill>
+                <a:schemeClr val="bg1"/>
+              </a:solidFill>
+            </a:endParaRPr>
+          </a:p>
+          <a:p>
+            <a:pPr marL="457200" indent="-457200">
+              <a:buFontTx/>
+              <a:buChar char="-"/>
+            </a:pPr>
+            <a:endParaRPr lang="en-US" sz="2600" b="1" dirty="0">
+              <a:solidFill>
+                <a:schemeClr val="bg1"/>
+              </a:solidFill>
+            </a:endParaRPr>
+          </a:p>
+          <a:p>
+            <a:pPr marL="457200" indent="-457200">
+              <a:buFontTx/>
+              <a:buChar char="-"/>
+            </a:pPr>
+            <a:endParaRPr lang="en-US" sz="2600" b="1" dirty="0">
+              <a:solidFill>
+                <a:schemeClr val="bg1"/>
+              </a:solidFill>
+            </a:endParaRPr>
+          </a:p>
+        </p:txBody>
+      </p:sp>
+      <p:pic>
+        <p:nvPicPr>
+          <p:cNvPr id="5" name="Picture 4"/>
+          <p:cNvPicPr>
+            <a:picLocks noChangeAspect="1"/>
+          </p:cNvPicPr>
+          <p:nvPr/>
+        </p:nvPicPr>
+        <p:blipFill>
+          <a:blip r:embed="rId2">
+            <a:extLst>
+              <a:ext uri="{28A0092B-C50C-407E-A947-70E740481C1C}">
+                <a14:useLocalDpi xmlns:a14="http://schemas.microsoft.com/office/drawing/2010/main" val="0"/>
+              </a:ext>
+            </a:extLst>
+          </a:blip>
+          <a:stretch>
+            <a:fillRect/>
+          </a:stretch>
+        </p:blipFill>
+        <p:spPr>
+          <a:xfrm>
+            <a:off x="1662545" y="1479450"/>
+            <a:ext cx="8866910" cy="4875168"/>
+          </a:xfrm>
+          <a:prstGeom prst="rect">
+            <a:avLst/>
+          </a:prstGeom>
+        </p:spPr>
+      </p:pic>
+    </p:spTree>
+    <p:extLst>
+      <p:ext uri="{BB962C8B-B14F-4D97-AF65-F5344CB8AC3E}">
+        <p14:creationId xmlns:p14="http://schemas.microsoft.com/office/powerpoint/2010/main" val="3662928949"/>
       </p:ext>
     </p:extLst>
   </p:cSld>

</xml_diff>